<commit_message>
test respec su opo
</commit_message>
<xml_diff>
--- a/docs/figures.pptx
+++ b/docs/figures.pptx
@@ -9,14 +9,15 @@
     <p:sldMasterId id="2147483924" r:id="rId8"/>
   </p:sldMasterIdLst>
   <p:notesMasterIdLst>
-    <p:notesMasterId r:id="rId11"/>
+    <p:notesMasterId r:id="rId12"/>
   </p:notesMasterIdLst>
   <p:handoutMasterIdLst>
-    <p:handoutMasterId r:id="rId12"/>
+    <p:handoutMasterId r:id="rId13"/>
   </p:handoutMasterIdLst>
   <p:sldIdLst>
     <p:sldId id="405" r:id="rId9"/>
     <p:sldId id="407" r:id="rId10"/>
+    <p:sldId id="408" r:id="rId11"/>
   </p:sldIdLst>
   <p:sldSz cx="9906000" cy="6858000" type="A4"/>
   <p:notesSz cx="6858000" cy="9144000"/>
@@ -212,7 +213,7 @@
             <a:fld id="{A7959C71-B73A-49FF-9308-B24F710812B5}" type="datetimeFigureOut">
               <a:rPr lang="en-US" smtClean="0"/>
               <a:pPr/>
-              <a:t>7/18/22</a:t>
+              <a:t>7/22/22</a:t>
             </a:fld>
             <a:endParaRPr lang="en-US" dirty="0"/>
           </a:p>
@@ -364,7 +365,7 @@
             <a:fld id="{5468FC2B-D455-4AC4-9C5E-9317124768F4}" type="datetimeFigureOut">
               <a:rPr lang="en-US" smtClean="0"/>
               <a:pPr/>
-              <a:t>7/18/22</a:t>
+              <a:t>7/22/22</a:t>
             </a:fld>
             <a:endParaRPr lang="en-US" dirty="0"/>
           </a:p>
@@ -788,6 +789,90 @@
     <p:extLst>
       <p:ext uri="{BB962C8B-B14F-4D97-AF65-F5344CB8AC3E}">
         <p14:creationId xmlns:p14="http://schemas.microsoft.com/office/powerpoint/2010/main" val="2558891205"/>
+      </p:ext>
+    </p:extLst>
+  </p:cSld>
+  <p:clrMapOvr>
+    <a:masterClrMapping/>
+  </p:clrMapOvr>
+</p:notes>
+</file>
+
+<file path=ppt/notesSlides/notesSlide3.xml><?xml version="1.0" encoding="utf-8"?>
+<p:notes xmlns:a="http://schemas.openxmlformats.org/drawingml/2006/main" xmlns:r="http://schemas.openxmlformats.org/officeDocument/2006/relationships" xmlns:p="http://schemas.openxmlformats.org/presentationml/2006/main">
+  <p:cSld>
+    <p:spTree>
+      <p:nvGrpSpPr>
+        <p:cNvPr id="1" name=""/>
+        <p:cNvGrpSpPr/>
+        <p:nvPr/>
+      </p:nvGrpSpPr>
+      <p:grpSpPr>
+        <a:xfrm>
+          <a:off x="0" y="0"/>
+          <a:ext cx="0" cy="0"/>
+          <a:chOff x="0" y="0"/>
+          <a:chExt cx="0" cy="0"/>
+        </a:xfrm>
+      </p:grpSpPr>
+      <p:sp>
+        <p:nvSpPr>
+          <p:cNvPr id="2" name="Segnaposto immagine diapositiva 1"/>
+          <p:cNvSpPr>
+            <a:spLocks noGrp="1" noRot="1" noChangeAspect="1"/>
+          </p:cNvSpPr>
+          <p:nvPr>
+            <p:ph type="sldImg"/>
+          </p:nvPr>
+        </p:nvSpPr>
+        <p:spPr/>
+      </p:sp>
+      <p:sp>
+        <p:nvSpPr>
+          <p:cNvPr id="3" name="Segnaposto note 2"/>
+          <p:cNvSpPr>
+            <a:spLocks noGrp="1"/>
+          </p:cNvSpPr>
+          <p:nvPr>
+            <p:ph type="body" idx="1"/>
+          </p:nvPr>
+        </p:nvSpPr>
+        <p:spPr/>
+        <p:txBody>
+          <a:bodyPr/>
+          <a:lstStyle/>
+          <a:p>
+            <a:endParaRPr lang="en-GB" dirty="0"/>
+          </a:p>
+        </p:txBody>
+      </p:sp>
+      <p:sp>
+        <p:nvSpPr>
+          <p:cNvPr id="4" name="Segnaposto numero diapositiva 3"/>
+          <p:cNvSpPr>
+            <a:spLocks noGrp="1"/>
+          </p:cNvSpPr>
+          <p:nvPr>
+            <p:ph type="sldNum" sz="quarter" idx="5"/>
+          </p:nvPr>
+        </p:nvSpPr>
+        <p:spPr/>
+        <p:txBody>
+          <a:bodyPr/>
+          <a:lstStyle/>
+          <a:p>
+            <a:fld id="{D04AFCC7-3E30-3240-B9B9-58EEE70978C5}" type="slidenum">
+              <a:rPr lang="en-GB" smtClean="0"/>
+              <a:t>3</a:t>
+            </a:fld>
+            <a:endParaRPr lang="en-GB" dirty="0"/>
+          </a:p>
+        </p:txBody>
+      </p:sp>
+    </p:spTree>
+    <p:extLst>
+      <p:ext uri="{BB962C8B-B14F-4D97-AF65-F5344CB8AC3E}">
+        <p14:creationId xmlns:p14="http://schemas.microsoft.com/office/powerpoint/2010/main" val="2576345650"/>
       </p:ext>
     </p:extLst>
   </p:cSld>
@@ -16930,7 +17015,7 @@
           <a:noFill/>
           <a:extLst>
             <a:ext uri="{909E8E84-426E-40dd-AFC4-6F175D3DCCD1}">
-              <a14:hiddenFill xmlns:a14="http://schemas.microsoft.com/office/drawing/2010/main" xmlns="">
+              <a14:hiddenFill xmlns="" xmlns:a14="http://schemas.microsoft.com/office/drawing/2010/main">
                 <a:solidFill>
                   <a:srgbClr val="FFFFFF"/>
                 </a:solidFill>
@@ -16967,12 +17052,12 @@
           <a:effectLst/>
           <a:extLst>
             <a:ext uri="{909E8E84-426E-40dd-AFC4-6F175D3DCCD1}">
-              <a14:hiddenFill xmlns:a14="http://schemas.microsoft.com/office/drawing/2010/main" xmlns="">
+              <a14:hiddenFill xmlns="" xmlns:a14="http://schemas.microsoft.com/office/drawing/2010/main">
                 <a:noFill/>
               </a14:hiddenFill>
             </a:ext>
             <a:ext uri="{AF507438-7753-43e0-B8FC-AC1667EBCBE1}">
-              <a14:hiddenEffects xmlns:a14="http://schemas.microsoft.com/office/drawing/2010/main" xmlns="">
+              <a14:hiddenEffects xmlns="" xmlns:a14="http://schemas.microsoft.com/office/drawing/2010/main">
                 <a:effectLst>
                   <a:outerShdw blurRad="63500" dist="38099" dir="2700000" algn="ctr" rotWithShape="0">
                     <a:schemeClr val="bg2">
@@ -17020,12 +17105,12 @@
           <a:effectLst/>
           <a:extLst>
             <a:ext uri="{909E8E84-426E-40dd-AFC4-6F175D3DCCD1}">
-              <a14:hiddenFill xmlns:a14="http://schemas.microsoft.com/office/drawing/2010/main" xmlns="">
+              <a14:hiddenFill xmlns="" xmlns:a14="http://schemas.microsoft.com/office/drawing/2010/main">
                 <a:noFill/>
               </a14:hiddenFill>
             </a:ext>
             <a:ext uri="{AF507438-7753-43e0-B8FC-AC1667EBCBE1}">
-              <a14:hiddenEffects xmlns:a14="http://schemas.microsoft.com/office/drawing/2010/main" xmlns="">
+              <a14:hiddenEffects xmlns="" xmlns:a14="http://schemas.microsoft.com/office/drawing/2010/main">
                 <a:effectLst>
                   <a:outerShdw blurRad="63500" dist="38099" dir="2700000" algn="ctr" rotWithShape="0">
                     <a:schemeClr val="bg2">
@@ -17080,14 +17165,14 @@
           </a:ln>
           <a:extLst>
             <a:ext uri="{909E8E84-426E-40dd-AFC4-6F175D3DCCD1}">
-              <a14:hiddenFill xmlns:a14="http://schemas.microsoft.com/office/drawing/2010/main" xmlns="">
+              <a14:hiddenFill xmlns="" xmlns:a14="http://schemas.microsoft.com/office/drawing/2010/main">
                 <a:solidFill>
                   <a:srgbClr val="FFFFFF"/>
                 </a:solidFill>
               </a14:hiddenFill>
             </a:ext>
             <a:ext uri="{91240B29-F687-4f45-9708-019B960494DF}">
-              <a14:hiddenLine xmlns:a14="http://schemas.microsoft.com/office/drawing/2010/main" xmlns="" w="9525">
+              <a14:hiddenLine xmlns="" xmlns:a14="http://schemas.microsoft.com/office/drawing/2010/main" w="9525">
                 <a:solidFill>
                   <a:srgbClr val="000000"/>
                 </a:solidFill>
@@ -17127,12 +17212,12 @@
           <a:effectLst/>
           <a:extLst>
             <a:ext uri="{909E8E84-426E-40dd-AFC4-6F175D3DCCD1}">
-              <a14:hiddenFill xmlns:a14="http://schemas.microsoft.com/office/drawing/2010/main" xmlns="">
+              <a14:hiddenFill xmlns="" xmlns:a14="http://schemas.microsoft.com/office/drawing/2010/main">
                 <a:noFill/>
               </a14:hiddenFill>
             </a:ext>
             <a:ext uri="{AF507438-7753-43e0-B8FC-AC1667EBCBE1}">
-              <a14:hiddenEffects xmlns:a14="http://schemas.microsoft.com/office/drawing/2010/main" xmlns="">
+              <a14:hiddenEffects xmlns="" xmlns:a14="http://schemas.microsoft.com/office/drawing/2010/main">
                 <a:effectLst>
                   <a:outerShdw blurRad="63500" dist="38099" dir="2700000" algn="ctr" rotWithShape="0">
                     <a:schemeClr val="bg2">
@@ -17180,12 +17265,12 @@
           <a:effectLst/>
           <a:extLst>
             <a:ext uri="{909E8E84-426E-40dd-AFC4-6F175D3DCCD1}">
-              <a14:hiddenFill xmlns:a14="http://schemas.microsoft.com/office/drawing/2010/main" xmlns="">
+              <a14:hiddenFill xmlns="" xmlns:a14="http://schemas.microsoft.com/office/drawing/2010/main">
                 <a:noFill/>
               </a14:hiddenFill>
             </a:ext>
             <a:ext uri="{AF507438-7753-43e0-B8FC-AC1667EBCBE1}">
-              <a14:hiddenEffects xmlns:a14="http://schemas.microsoft.com/office/drawing/2010/main" xmlns="">
+              <a14:hiddenEffects xmlns="" xmlns:a14="http://schemas.microsoft.com/office/drawing/2010/main">
                 <a:effectLst>
                   <a:outerShdw blurRad="63500" dist="38099" dir="2700000" algn="ctr" rotWithShape="0">
                     <a:schemeClr val="bg2">
@@ -17726,7 +17811,7 @@
           <a:noFill/>
           <a:extLst>
             <a:ext uri="{909E8E84-426E-40dd-AFC4-6F175D3DCCD1}">
-              <a14:hiddenFill xmlns:a14="http://schemas.microsoft.com/office/drawing/2010/main" xmlns="">
+              <a14:hiddenFill xmlns="" xmlns:a14="http://schemas.microsoft.com/office/drawing/2010/main">
                 <a:solidFill>
                   <a:srgbClr val="FFFFFF"/>
                 </a:solidFill>
@@ -17770,14 +17855,14 @@
           </a:ln>
           <a:extLst>
             <a:ext uri="{909E8E84-426E-40dd-AFC4-6F175D3DCCD1}">
-              <a14:hiddenFill xmlns:a14="http://schemas.microsoft.com/office/drawing/2010/main" xmlns="">
+              <a14:hiddenFill xmlns="" xmlns:a14="http://schemas.microsoft.com/office/drawing/2010/main">
                 <a:solidFill>
                   <a:srgbClr val="FFFFFF"/>
                 </a:solidFill>
               </a14:hiddenFill>
             </a:ext>
             <a:ext uri="{91240B29-F687-4f45-9708-019B960494DF}">
-              <a14:hiddenLine xmlns:a14="http://schemas.microsoft.com/office/drawing/2010/main" xmlns="" w="9525">
+              <a14:hiddenLine xmlns="" xmlns:a14="http://schemas.microsoft.com/office/drawing/2010/main" w="9525">
                 <a:solidFill>
                   <a:srgbClr val="000000"/>
                 </a:solidFill>
@@ -17817,12 +17902,12 @@
           <a:effectLst/>
           <a:extLst>
             <a:ext uri="{909E8E84-426E-40dd-AFC4-6F175D3DCCD1}">
-              <a14:hiddenFill xmlns:a14="http://schemas.microsoft.com/office/drawing/2010/main" xmlns="">
+              <a14:hiddenFill xmlns="" xmlns:a14="http://schemas.microsoft.com/office/drawing/2010/main">
                 <a:noFill/>
               </a14:hiddenFill>
             </a:ext>
             <a:ext uri="{AF507438-7753-43e0-B8FC-AC1667EBCBE1}">
-              <a14:hiddenEffects xmlns:a14="http://schemas.microsoft.com/office/drawing/2010/main" xmlns="">
+              <a14:hiddenEffects xmlns="" xmlns:a14="http://schemas.microsoft.com/office/drawing/2010/main">
                 <a:effectLst>
                   <a:outerShdw blurRad="63500" dist="38099" dir="2700000" algn="ctr" rotWithShape="0">
                     <a:schemeClr val="bg2">
@@ -17872,12 +17957,12 @@
           <a:effectLst/>
           <a:extLst>
             <a:ext uri="{909E8E84-426E-40dd-AFC4-6F175D3DCCD1}">
-              <a14:hiddenFill xmlns:a14="http://schemas.microsoft.com/office/drawing/2010/main" xmlns="">
+              <a14:hiddenFill xmlns="" xmlns:a14="http://schemas.microsoft.com/office/drawing/2010/main">
                 <a:noFill/>
               </a14:hiddenFill>
             </a:ext>
             <a:ext uri="{AF507438-7753-43e0-B8FC-AC1667EBCBE1}">
-              <a14:hiddenEffects xmlns:a14="http://schemas.microsoft.com/office/drawing/2010/main" xmlns="">
+              <a14:hiddenEffects xmlns="" xmlns:a14="http://schemas.microsoft.com/office/drawing/2010/main">
                 <a:effectLst>
                   <a:outerShdw blurRad="63500" dist="38099" dir="2700000" algn="ctr" rotWithShape="0">
                     <a:schemeClr val="bg2">
@@ -17927,12 +18012,12 @@
           <a:effectLst/>
           <a:extLst>
             <a:ext uri="{909E8E84-426E-40dd-AFC4-6F175D3DCCD1}">
-              <a14:hiddenFill xmlns:a14="http://schemas.microsoft.com/office/drawing/2010/main" xmlns="">
+              <a14:hiddenFill xmlns="" xmlns:a14="http://schemas.microsoft.com/office/drawing/2010/main">
                 <a:noFill/>
               </a14:hiddenFill>
             </a:ext>
             <a:ext uri="{AF507438-7753-43e0-B8FC-AC1667EBCBE1}">
-              <a14:hiddenEffects xmlns:a14="http://schemas.microsoft.com/office/drawing/2010/main" xmlns="">
+              <a14:hiddenEffects xmlns="" xmlns:a14="http://schemas.microsoft.com/office/drawing/2010/main">
                 <a:effectLst>
                   <a:outerShdw blurRad="63500" dist="38099" dir="2700000" algn="ctr" rotWithShape="0">
                     <a:schemeClr val="bg2">
@@ -17982,12 +18067,12 @@
           <a:effectLst/>
           <a:extLst>
             <a:ext uri="{909E8E84-426E-40dd-AFC4-6F175D3DCCD1}">
-              <a14:hiddenFill xmlns:a14="http://schemas.microsoft.com/office/drawing/2010/main" xmlns="">
+              <a14:hiddenFill xmlns="" xmlns:a14="http://schemas.microsoft.com/office/drawing/2010/main">
                 <a:noFill/>
               </a14:hiddenFill>
             </a:ext>
             <a:ext uri="{AF507438-7753-43e0-B8FC-AC1667EBCBE1}">
-              <a14:hiddenEffects xmlns:a14="http://schemas.microsoft.com/office/drawing/2010/main" xmlns="">
+              <a14:hiddenEffects xmlns="" xmlns:a14="http://schemas.microsoft.com/office/drawing/2010/main">
                 <a:effectLst>
                   <a:outerShdw blurRad="63500" dist="38099" dir="2700000" algn="ctr" rotWithShape="0">
                     <a:schemeClr val="bg2">
@@ -26148,6 +26233,3004 @@
     <p:extLst>
       <p:ext uri="{BB962C8B-B14F-4D97-AF65-F5344CB8AC3E}">
         <p14:creationId xmlns:p14="http://schemas.microsoft.com/office/powerpoint/2010/main" val="330528434"/>
+      </p:ext>
+    </p:extLst>
+  </p:cSld>
+  <p:clrMapOvr>
+    <a:masterClrMapping/>
+  </p:clrMapOvr>
+  <p:timing>
+    <p:tnLst>
+      <p:par>
+        <p:cTn id="1" dur="indefinite" restart="never" nodeType="tmRoot">
+          <p:childTnLst>
+            <p:seq concurrent="1" nextAc="seek">
+              <p:cTn id="2" dur="indefinite" nodeType="mainSeq">
+                <p:childTnLst>
+                  <p:par>
+                    <p:cTn id="3" fill="hold">
+                      <p:stCondLst>
+                        <p:cond delay="indefinite"/>
+                        <p:cond evt="onBegin" delay="0">
+                          <p:tn val="2"/>
+                        </p:cond>
+                      </p:stCondLst>
+                      <p:childTnLst>
+                        <p:par>
+                          <p:cTn id="4" fill="hold">
+                            <p:stCondLst>
+                              <p:cond delay="0"/>
+                            </p:stCondLst>
+                            <p:childTnLst>
+                              <p:par>
+                                <p:cTn id="5" presetID="21" presetClass="entr" presetSubtype="1" fill="hold" nodeType="afterEffect">
+                                  <p:stCondLst>
+                                    <p:cond delay="0"/>
+                                  </p:stCondLst>
+                                  <p:childTnLst>
+                                    <p:set>
+                                      <p:cBhvr>
+                                        <p:cTn id="6" dur="1" fill="hold">
+                                          <p:stCondLst>
+                                            <p:cond delay="0"/>
+                                          </p:stCondLst>
+                                        </p:cTn>
+                                        <p:tgtEl>
+                                          <p:spTgt spid="130"/>
+                                        </p:tgtEl>
+                                        <p:attrNameLst>
+                                          <p:attrName>style.visibility</p:attrName>
+                                        </p:attrNameLst>
+                                      </p:cBhvr>
+                                      <p:to>
+                                        <p:strVal val="visible"/>
+                                      </p:to>
+                                    </p:set>
+                                    <p:animEffect transition="in" filter="wheel(1)">
+                                      <p:cBhvr>
+                                        <p:cTn id="7" dur="1000"/>
+                                        <p:tgtEl>
+                                          <p:spTgt spid="130"/>
+                                        </p:tgtEl>
+                                      </p:cBhvr>
+                                    </p:animEffect>
+                                  </p:childTnLst>
+                                </p:cTn>
+                              </p:par>
+                            </p:childTnLst>
+                          </p:cTn>
+                        </p:par>
+                      </p:childTnLst>
+                    </p:cTn>
+                  </p:par>
+                </p:childTnLst>
+              </p:cTn>
+              <p:prevCondLst>
+                <p:cond evt="onPrev" delay="0">
+                  <p:tgtEl>
+                    <p:sldTgt/>
+                  </p:tgtEl>
+                </p:cond>
+              </p:prevCondLst>
+              <p:nextCondLst>
+                <p:cond evt="onNext" delay="0">
+                  <p:tgtEl>
+                    <p:sldTgt/>
+                  </p:tgtEl>
+                </p:cond>
+              </p:nextCondLst>
+            </p:seq>
+          </p:childTnLst>
+        </p:cTn>
+      </p:par>
+    </p:tnLst>
+  </p:timing>
+</p:sld>
+</file>
+
+<file path=ppt/slides/slide3.xml><?xml version="1.0" encoding="utf-8"?>
+<p:sld xmlns:a="http://schemas.openxmlformats.org/drawingml/2006/main" xmlns:r="http://schemas.openxmlformats.org/officeDocument/2006/relationships" xmlns:p="http://schemas.openxmlformats.org/presentationml/2006/main">
+  <p:cSld>
+    <p:spTree>
+      <p:nvGrpSpPr>
+        <p:cNvPr id="1" name=""/>
+        <p:cNvGrpSpPr/>
+        <p:nvPr/>
+      </p:nvGrpSpPr>
+      <p:grpSpPr>
+        <a:xfrm>
+          <a:off x="0" y="0"/>
+          <a:ext cx="0" cy="0"/>
+          <a:chOff x="0" y="0"/>
+          <a:chExt cx="0" cy="0"/>
+        </a:xfrm>
+      </p:grpSpPr>
+      <p:sp>
+        <p:nvSpPr>
+          <p:cNvPr id="2" name="Rettangolo 1">
+            <a:extLst>
+              <a:ext uri="{FF2B5EF4-FFF2-40B4-BE49-F238E27FC236}">
+                <a16:creationId xmlns:a16="http://schemas.microsoft.com/office/drawing/2014/main" id="{7D326DAE-C38F-DCA9-75ED-4B91C58BDC80}"/>
+              </a:ext>
+            </a:extLst>
+          </p:cNvPr>
+          <p:cNvSpPr/>
+          <p:nvPr/>
+        </p:nvSpPr>
+        <p:spPr>
+          <a:xfrm>
+            <a:off x="7375070" y="88106"/>
+            <a:ext cx="2378530" cy="4816319"/>
+          </a:xfrm>
+          <a:prstGeom prst="rect">
+            <a:avLst/>
+          </a:prstGeom>
+          <a:solidFill>
+            <a:schemeClr val="accent2"/>
+          </a:solidFill>
+          <a:ln w="28575">
+            <a:solidFill>
+              <a:schemeClr val="accent2"/>
+            </a:solidFill>
+          </a:ln>
+        </p:spPr>
+        <p:style>
+          <a:lnRef idx="1">
+            <a:schemeClr val="accent1"/>
+          </a:lnRef>
+          <a:fillRef idx="3">
+            <a:schemeClr val="accent1"/>
+          </a:fillRef>
+          <a:effectRef idx="2">
+            <a:schemeClr val="accent1"/>
+          </a:effectRef>
+          <a:fontRef idx="minor">
+            <a:schemeClr val="lt1"/>
+          </a:fontRef>
+        </p:style>
+        <p:txBody>
+          <a:bodyPr rtlCol="0" anchor="ctr"/>
+          <a:lstStyle/>
+          <a:p>
+            <a:pPr algn="ctr"/>
+            <a:endParaRPr lang="en-GB"/>
+          </a:p>
+        </p:txBody>
+      </p:sp>
+      <p:cxnSp>
+        <p:nvCxnSpPr>
+          <p:cNvPr id="33" name="Connettore 4 32">
+            <a:extLst>
+              <a:ext uri="{FF2B5EF4-FFF2-40B4-BE49-F238E27FC236}">
+                <a16:creationId xmlns:a16="http://schemas.microsoft.com/office/drawing/2014/main" id="{2FFD3D08-28B3-B3B3-0AB9-1D97FBC1CF2F}"/>
+              </a:ext>
+            </a:extLst>
+          </p:cNvPr>
+          <p:cNvCxnSpPr/>
+          <p:nvPr/>
+        </p:nvCxnSpPr>
+        <p:spPr>
+          <a:xfrm rot="16200000" flipH="1">
+            <a:off x="3174587" y="3348021"/>
+            <a:ext cx="1606655" cy="1065166"/>
+          </a:xfrm>
+          <a:prstGeom prst="bentConnector2">
+            <a:avLst/>
+          </a:prstGeom>
+          <a:ln w="28575">
+            <a:solidFill>
+              <a:schemeClr val="accent4"/>
+            </a:solidFill>
+            <a:tailEnd type="triangle"/>
+          </a:ln>
+        </p:spPr>
+        <p:style>
+          <a:lnRef idx="2">
+            <a:schemeClr val="accent1"/>
+          </a:lnRef>
+          <a:fillRef idx="0">
+            <a:schemeClr val="accent1"/>
+          </a:fillRef>
+          <a:effectRef idx="1">
+            <a:schemeClr val="accent1"/>
+          </a:effectRef>
+          <a:fontRef idx="minor">
+            <a:schemeClr val="tx1"/>
+          </a:fontRef>
+        </p:style>
+      </p:cxnSp>
+      <p:pic>
+        <p:nvPicPr>
+          <p:cNvPr id="4" name="Immagine 3">
+            <a:extLst>
+              <a:ext uri="{FF2B5EF4-FFF2-40B4-BE49-F238E27FC236}">
+                <a16:creationId xmlns:a16="http://schemas.microsoft.com/office/drawing/2014/main" id="{E9A70152-93AF-BAA5-99B6-23F734045944}"/>
+              </a:ext>
+            </a:extLst>
+          </p:cNvPr>
+          <p:cNvPicPr>
+            <a:picLocks noChangeAspect="1"/>
+          </p:cNvPicPr>
+          <p:nvPr/>
+        </p:nvPicPr>
+        <p:blipFill>
+          <a:blip r:embed="rId3"/>
+          <a:stretch>
+            <a:fillRect/>
+          </a:stretch>
+        </p:blipFill>
+        <p:spPr>
+          <a:xfrm>
+            <a:off x="3687556" y="1288586"/>
+            <a:ext cx="1415185" cy="303675"/>
+          </a:xfrm>
+          <a:prstGeom prst="rect">
+            <a:avLst/>
+          </a:prstGeom>
+        </p:spPr>
+      </p:pic>
+      <p:pic>
+        <p:nvPicPr>
+          <p:cNvPr id="5" name="Immagine 4">
+            <a:extLst>
+              <a:ext uri="{FF2B5EF4-FFF2-40B4-BE49-F238E27FC236}">
+                <a16:creationId xmlns:a16="http://schemas.microsoft.com/office/drawing/2014/main" id="{123991A0-5D9E-29FE-E514-801A64C17998}"/>
+              </a:ext>
+            </a:extLst>
+          </p:cNvPr>
+          <p:cNvPicPr>
+            <a:picLocks noChangeAspect="1"/>
+          </p:cNvPicPr>
+          <p:nvPr/>
+        </p:nvPicPr>
+        <p:blipFill>
+          <a:blip r:embed="rId4"/>
+          <a:stretch>
+            <a:fillRect/>
+          </a:stretch>
+        </p:blipFill>
+        <p:spPr>
+          <a:xfrm>
+            <a:off x="5546270" y="1221127"/>
+            <a:ext cx="1571143" cy="407515"/>
+          </a:xfrm>
+          <a:prstGeom prst="rect">
+            <a:avLst/>
+          </a:prstGeom>
+        </p:spPr>
+      </p:pic>
+      <p:sp>
+        <p:nvSpPr>
+          <p:cNvPr id="10" name="Rettangolo con angoli arrotondati 9">
+            <a:extLst>
+              <a:ext uri="{FF2B5EF4-FFF2-40B4-BE49-F238E27FC236}">
+                <a16:creationId xmlns:a16="http://schemas.microsoft.com/office/drawing/2014/main" id="{40D766DC-6D59-A0BE-B8A0-8F277A23CFD9}"/>
+              </a:ext>
+            </a:extLst>
+          </p:cNvPr>
+          <p:cNvSpPr/>
+          <p:nvPr/>
+        </p:nvSpPr>
+        <p:spPr>
+          <a:xfrm>
+            <a:off x="6183917" y="2055418"/>
+            <a:ext cx="1133278" cy="1230961"/>
+          </a:xfrm>
+          <a:prstGeom prst="roundRect">
+            <a:avLst/>
+          </a:prstGeom>
+          <a:ln>
+            <a:solidFill>
+              <a:schemeClr val="accent4"/>
+            </a:solidFill>
+          </a:ln>
+        </p:spPr>
+        <p:style>
+          <a:lnRef idx="2">
+            <a:schemeClr val="accent1">
+              <a:shade val="50000"/>
+            </a:schemeClr>
+          </a:lnRef>
+          <a:fillRef idx="1">
+            <a:schemeClr val="accent1"/>
+          </a:fillRef>
+          <a:effectRef idx="0">
+            <a:schemeClr val="accent1"/>
+          </a:effectRef>
+          <a:fontRef idx="minor">
+            <a:schemeClr val="lt1"/>
+          </a:fontRef>
+        </p:style>
+        <p:txBody>
+          <a:bodyPr rtlCol="0" anchor="t"/>
+          <a:lstStyle/>
+          <a:p>
+            <a:pPr algn="ctr"/>
+            <a:r>
+              <a:rPr lang="en-GB" sz="1463" dirty="0"/>
+              <a:t>SuperSet Adapter</a:t>
+            </a:r>
+          </a:p>
+        </p:txBody>
+      </p:sp>
+      <p:grpSp>
+        <p:nvGrpSpPr>
+          <p:cNvPr id="26" name="Gruppo 25">
+            <a:extLst>
+              <a:ext uri="{FF2B5EF4-FFF2-40B4-BE49-F238E27FC236}">
+                <a16:creationId xmlns:a16="http://schemas.microsoft.com/office/drawing/2014/main" id="{CEED9B54-C521-B289-3691-5B4FFE22D872}"/>
+              </a:ext>
+            </a:extLst>
+          </p:cNvPr>
+          <p:cNvGrpSpPr/>
+          <p:nvPr/>
+        </p:nvGrpSpPr>
+        <p:grpSpPr>
+          <a:xfrm>
+            <a:off x="4525945" y="4361579"/>
+            <a:ext cx="3306325" cy="1048621"/>
+            <a:chOff x="10461862" y="3800276"/>
+            <a:chExt cx="4069323" cy="1290610"/>
+          </a:xfrm>
+        </p:grpSpPr>
+        <p:sp>
+          <p:nvSpPr>
+            <p:cNvPr id="25" name="Rettangolo con angoli arrotondati 24">
+              <a:extLst>
+                <a:ext uri="{FF2B5EF4-FFF2-40B4-BE49-F238E27FC236}">
+                  <a16:creationId xmlns:a16="http://schemas.microsoft.com/office/drawing/2014/main" id="{8C7B4F0B-8389-E1C1-9FCF-FBFDCD12FF25}"/>
+                </a:ext>
+              </a:extLst>
+            </p:cNvPr>
+            <p:cNvSpPr/>
+            <p:nvPr/>
+          </p:nvSpPr>
+          <p:spPr>
+            <a:xfrm>
+              <a:off x="10461862" y="3800276"/>
+              <a:ext cx="4069323" cy="1290610"/>
+            </a:xfrm>
+            <a:prstGeom prst="roundRect">
+              <a:avLst/>
+            </a:prstGeom>
+            <a:solidFill>
+              <a:schemeClr val="bg1">
+                <a:lumMod val="85000"/>
+              </a:schemeClr>
+            </a:solidFill>
+            <a:ln>
+              <a:solidFill>
+                <a:schemeClr val="accent4"/>
+              </a:solidFill>
+            </a:ln>
+          </p:spPr>
+          <p:style>
+            <a:lnRef idx="2">
+              <a:schemeClr val="accent1">
+                <a:shade val="50000"/>
+              </a:schemeClr>
+            </a:lnRef>
+            <a:fillRef idx="1">
+              <a:schemeClr val="accent1"/>
+            </a:fillRef>
+            <a:effectRef idx="0">
+              <a:schemeClr val="accent1"/>
+            </a:effectRef>
+            <a:fontRef idx="minor">
+              <a:schemeClr val="lt1"/>
+            </a:fontRef>
+          </p:style>
+          <p:txBody>
+            <a:bodyPr rtlCol="0" anchor="ctr"/>
+            <a:lstStyle/>
+            <a:p>
+              <a:pPr algn="ctr"/>
+              <a:endParaRPr lang="en-GB" sz="1463" dirty="0"/>
+            </a:p>
+          </p:txBody>
+        </p:sp>
+        <p:pic>
+          <p:nvPicPr>
+            <p:cNvPr id="16" name="Picture 2">
+              <a:extLst>
+                <a:ext uri="{FF2B5EF4-FFF2-40B4-BE49-F238E27FC236}">
+                  <a16:creationId xmlns:a16="http://schemas.microsoft.com/office/drawing/2014/main" id="{023904B5-D266-93DC-6157-EDCDD95EECC1}"/>
+                </a:ext>
+              </a:extLst>
+            </p:cNvPr>
+            <p:cNvPicPr>
+              <a:picLocks noChangeAspect="1" noChangeArrowheads="1"/>
+            </p:cNvPicPr>
+            <p:nvPr/>
+          </p:nvPicPr>
+          <p:blipFill rotWithShape="1">
+            <a:blip r:embed="rId5">
+              <a:extLst>
+                <a:ext uri="{28A0092B-C50C-407E-A947-70E740481C1C}">
+                  <a14:useLocalDpi xmlns:a14="http://schemas.microsoft.com/office/drawing/2010/main" val="0"/>
+                </a:ext>
+              </a:extLst>
+            </a:blip>
+            <a:srcRect l="1" t="-15685" r="-2513" b="-1"/>
+            <a:stretch/>
+          </p:blipFill>
+          <p:spPr bwMode="auto">
+            <a:xfrm>
+              <a:off x="10664927" y="3956568"/>
+              <a:ext cx="914400" cy="307761"/>
+            </a:xfrm>
+            <a:prstGeom prst="rect">
+              <a:avLst/>
+            </a:prstGeom>
+            <a:noFill/>
+            <a:extLst>
+              <a:ext uri="{909E8E84-426E-40DD-AFC4-6F175D3DCCD1}">
+                <a14:hiddenFill xmlns:a14="http://schemas.microsoft.com/office/drawing/2010/main">
+                  <a:solidFill>
+                    <a:srgbClr val="FFFFFF"/>
+                  </a:solidFill>
+                </a14:hiddenFill>
+              </a:ext>
+            </a:extLst>
+          </p:spPr>
+        </p:pic>
+      </p:grpSp>
+      <p:sp>
+        <p:nvSpPr>
+          <p:cNvPr id="41" name="Rettangolo con angoli arrotondati 40">
+            <a:extLst>
+              <a:ext uri="{FF2B5EF4-FFF2-40B4-BE49-F238E27FC236}">
+                <a16:creationId xmlns:a16="http://schemas.microsoft.com/office/drawing/2014/main" id="{BBA3A587-6B3B-3EEF-8373-134CFB2F279A}"/>
+              </a:ext>
+            </a:extLst>
+          </p:cNvPr>
+          <p:cNvSpPr/>
+          <p:nvPr/>
+        </p:nvSpPr>
+        <p:spPr>
+          <a:xfrm>
+            <a:off x="4531634" y="2792095"/>
+            <a:ext cx="1310127" cy="508065"/>
+          </a:xfrm>
+          <a:prstGeom prst="roundRect">
+            <a:avLst/>
+          </a:prstGeom>
+          <a:ln>
+            <a:solidFill>
+              <a:schemeClr val="accent4"/>
+            </a:solidFill>
+          </a:ln>
+        </p:spPr>
+        <p:style>
+          <a:lnRef idx="2">
+            <a:schemeClr val="accent1">
+              <a:shade val="50000"/>
+            </a:schemeClr>
+          </a:lnRef>
+          <a:fillRef idx="1">
+            <a:schemeClr val="accent1"/>
+          </a:fillRef>
+          <a:effectRef idx="0">
+            <a:schemeClr val="accent1"/>
+          </a:effectRef>
+          <a:fontRef idx="minor">
+            <a:schemeClr val="lt1"/>
+          </a:fontRef>
+        </p:style>
+        <p:txBody>
+          <a:bodyPr rtlCol="0" anchor="ctr"/>
+          <a:lstStyle/>
+          <a:p>
+            <a:r>
+              <a:rPr lang="en-GB" sz="1463" dirty="0"/>
+              <a:t>Log Time</a:t>
+            </a:r>
+          </a:p>
+        </p:txBody>
+      </p:sp>
+      <p:cxnSp>
+        <p:nvCxnSpPr>
+          <p:cNvPr id="42" name="Connettore 2 41">
+            <a:extLst>
+              <a:ext uri="{FF2B5EF4-FFF2-40B4-BE49-F238E27FC236}">
+                <a16:creationId xmlns:a16="http://schemas.microsoft.com/office/drawing/2014/main" id="{03E91115-415E-9386-1B9A-74D98AB99224}"/>
+              </a:ext>
+            </a:extLst>
+          </p:cNvPr>
+          <p:cNvCxnSpPr>
+            <a:cxnSpLocks/>
+          </p:cNvCxnSpPr>
+          <p:nvPr/>
+        </p:nvCxnSpPr>
+        <p:spPr>
+          <a:xfrm flipH="1" flipV="1">
+            <a:off x="5035177" y="2385305"/>
+            <a:ext cx="9718" cy="344466"/>
+          </a:xfrm>
+          <a:prstGeom prst="straightConnector1">
+            <a:avLst/>
+          </a:prstGeom>
+          <a:ln w="38100">
+            <a:solidFill>
+              <a:schemeClr val="tx1"/>
+            </a:solidFill>
+            <a:tailEnd type="triangle"/>
+          </a:ln>
+        </p:spPr>
+        <p:style>
+          <a:lnRef idx="1">
+            <a:schemeClr val="accent1"/>
+          </a:lnRef>
+          <a:fillRef idx="0">
+            <a:schemeClr val="accent1"/>
+          </a:fillRef>
+          <a:effectRef idx="0">
+            <a:schemeClr val="accent1"/>
+          </a:effectRef>
+          <a:fontRef idx="minor">
+            <a:schemeClr val="tx1"/>
+          </a:fontRef>
+        </p:style>
+      </p:cxnSp>
+      <p:sp>
+        <p:nvSpPr>
+          <p:cNvPr id="51" name="Rettangolo con angoli arrotondati 50">
+            <a:extLst>
+              <a:ext uri="{FF2B5EF4-FFF2-40B4-BE49-F238E27FC236}">
+                <a16:creationId xmlns:a16="http://schemas.microsoft.com/office/drawing/2014/main" id="{06A181F5-61D1-7769-9587-851F6D36523D}"/>
+              </a:ext>
+            </a:extLst>
+          </p:cNvPr>
+          <p:cNvSpPr/>
+          <p:nvPr/>
+        </p:nvSpPr>
+        <p:spPr>
+          <a:xfrm>
+            <a:off x="2562230" y="2758115"/>
+            <a:ext cx="1797098" cy="521120"/>
+          </a:xfrm>
+          <a:prstGeom prst="roundRect">
+            <a:avLst/>
+          </a:prstGeom>
+          <a:solidFill>
+            <a:schemeClr val="accent2"/>
+          </a:solidFill>
+          <a:ln>
+            <a:solidFill>
+              <a:schemeClr val="accent4"/>
+            </a:solidFill>
+          </a:ln>
+        </p:spPr>
+        <p:style>
+          <a:lnRef idx="2">
+            <a:schemeClr val="accent1">
+              <a:shade val="50000"/>
+            </a:schemeClr>
+          </a:lnRef>
+          <a:fillRef idx="1">
+            <a:schemeClr val="accent1"/>
+          </a:fillRef>
+          <a:effectRef idx="0">
+            <a:schemeClr val="accent1"/>
+          </a:effectRef>
+          <a:fontRef idx="minor">
+            <a:schemeClr val="lt1"/>
+          </a:fontRef>
+        </p:style>
+        <p:txBody>
+          <a:bodyPr rtlCol="0" anchor="ctr"/>
+          <a:lstStyle/>
+          <a:p>
+            <a:r>
+              <a:rPr lang="en-GB" sz="1463" dirty="0"/>
+              <a:t>Task manager</a:t>
+            </a:r>
+          </a:p>
+        </p:txBody>
+      </p:sp>
+      <p:sp>
+        <p:nvSpPr>
+          <p:cNvPr id="59" name="Rettangolo con angoli arrotondati 58">
+            <a:extLst>
+              <a:ext uri="{FF2B5EF4-FFF2-40B4-BE49-F238E27FC236}">
+                <a16:creationId xmlns:a16="http://schemas.microsoft.com/office/drawing/2014/main" id="{C16BD931-3595-53CD-C8D6-83CD6991D9A6}"/>
+              </a:ext>
+            </a:extLst>
+          </p:cNvPr>
+          <p:cNvSpPr/>
+          <p:nvPr/>
+        </p:nvSpPr>
+        <p:spPr>
+          <a:xfrm>
+            <a:off x="3115524" y="2055418"/>
+            <a:ext cx="2075046" cy="271250"/>
+          </a:xfrm>
+          <a:prstGeom prst="roundRect">
+            <a:avLst/>
+          </a:prstGeom>
+          <a:solidFill>
+            <a:schemeClr val="accent4"/>
+          </a:solidFill>
+        </p:spPr>
+        <p:style>
+          <a:lnRef idx="2">
+            <a:schemeClr val="accent1">
+              <a:shade val="50000"/>
+            </a:schemeClr>
+          </a:lnRef>
+          <a:fillRef idx="1">
+            <a:schemeClr val="accent1"/>
+          </a:fillRef>
+          <a:effectRef idx="0">
+            <a:schemeClr val="accent1"/>
+          </a:effectRef>
+          <a:fontRef idx="minor">
+            <a:schemeClr val="lt1"/>
+          </a:fontRef>
+        </p:style>
+        <p:txBody>
+          <a:bodyPr rtlCol="0" anchor="ctr"/>
+          <a:lstStyle/>
+          <a:p>
+            <a:pPr algn="ctr"/>
+            <a:r>
+              <a:rPr lang="en-GB" sz="1463" dirty="0">
+                <a:solidFill>
+                  <a:schemeClr val="tx1"/>
+                </a:solidFill>
+              </a:rPr>
+              <a:t>OpenProject REST API</a:t>
+            </a:r>
+          </a:p>
+        </p:txBody>
+      </p:sp>
+      <p:cxnSp>
+        <p:nvCxnSpPr>
+          <p:cNvPr id="66" name="Connettore 2 65">
+            <a:extLst>
+              <a:ext uri="{FF2B5EF4-FFF2-40B4-BE49-F238E27FC236}">
+                <a16:creationId xmlns:a16="http://schemas.microsoft.com/office/drawing/2014/main" id="{74B9FFCA-F405-DF16-E289-8EAFA91E0A6C}"/>
+              </a:ext>
+            </a:extLst>
+          </p:cNvPr>
+          <p:cNvCxnSpPr>
+            <a:cxnSpLocks/>
+          </p:cNvCxnSpPr>
+          <p:nvPr/>
+        </p:nvCxnSpPr>
+        <p:spPr>
+          <a:xfrm>
+            <a:off x="3363483" y="2389329"/>
+            <a:ext cx="0" cy="340442"/>
+          </a:xfrm>
+          <a:prstGeom prst="straightConnector1">
+            <a:avLst/>
+          </a:prstGeom>
+          <a:ln w="38100">
+            <a:solidFill>
+              <a:schemeClr val="tx1"/>
+            </a:solidFill>
+            <a:tailEnd type="triangle"/>
+          </a:ln>
+        </p:spPr>
+        <p:style>
+          <a:lnRef idx="1">
+            <a:schemeClr val="accent1"/>
+          </a:lnRef>
+          <a:fillRef idx="0">
+            <a:schemeClr val="accent1"/>
+          </a:fillRef>
+          <a:effectRef idx="0">
+            <a:schemeClr val="accent1"/>
+          </a:effectRef>
+          <a:fontRef idx="minor">
+            <a:schemeClr val="tx1"/>
+          </a:fontRef>
+        </p:style>
+      </p:cxnSp>
+      <p:sp>
+        <p:nvSpPr>
+          <p:cNvPr id="68" name="Rettangolo con angoli arrotondati 67">
+            <a:extLst>
+              <a:ext uri="{FF2B5EF4-FFF2-40B4-BE49-F238E27FC236}">
+                <a16:creationId xmlns:a16="http://schemas.microsoft.com/office/drawing/2014/main" id="{85F78BEF-1DB1-E2FB-AE45-BFB21137C0AD}"/>
+              </a:ext>
+            </a:extLst>
+          </p:cNvPr>
+          <p:cNvSpPr/>
+          <p:nvPr/>
+        </p:nvSpPr>
+        <p:spPr>
+          <a:xfrm>
+            <a:off x="8273038" y="4954867"/>
+            <a:ext cx="1381089" cy="400959"/>
+          </a:xfrm>
+          <a:prstGeom prst="roundRect">
+            <a:avLst/>
+          </a:prstGeom>
+          <a:solidFill>
+            <a:schemeClr val="accent6"/>
+          </a:solidFill>
+        </p:spPr>
+        <p:style>
+          <a:lnRef idx="2">
+            <a:schemeClr val="accent1">
+              <a:shade val="50000"/>
+            </a:schemeClr>
+          </a:lnRef>
+          <a:fillRef idx="1">
+            <a:schemeClr val="accent1"/>
+          </a:fillRef>
+          <a:effectRef idx="0">
+            <a:schemeClr val="accent1"/>
+          </a:effectRef>
+          <a:fontRef idx="minor">
+            <a:schemeClr val="lt1"/>
+          </a:fontRef>
+        </p:style>
+        <p:txBody>
+          <a:bodyPr rtlCol="0" anchor="ctr"/>
+          <a:lstStyle/>
+          <a:p>
+            <a:r>
+              <a:rPr lang="en-GB" sz="1463" dirty="0"/>
+              <a:t>Classifier</a:t>
+            </a:r>
+          </a:p>
+        </p:txBody>
+      </p:sp>
+      <p:cxnSp>
+        <p:nvCxnSpPr>
+          <p:cNvPr id="72" name="Connettore 2 71">
+            <a:extLst>
+              <a:ext uri="{FF2B5EF4-FFF2-40B4-BE49-F238E27FC236}">
+                <a16:creationId xmlns:a16="http://schemas.microsoft.com/office/drawing/2014/main" id="{84F432F4-9375-8DF3-4D28-7D40F0BE2C39}"/>
+              </a:ext>
+            </a:extLst>
+          </p:cNvPr>
+          <p:cNvCxnSpPr>
+            <a:cxnSpLocks/>
+          </p:cNvCxnSpPr>
+          <p:nvPr/>
+        </p:nvCxnSpPr>
+        <p:spPr>
+          <a:xfrm flipH="1" flipV="1">
+            <a:off x="7863223" y="4539495"/>
+            <a:ext cx="436965" cy="11722"/>
+          </a:xfrm>
+          <a:prstGeom prst="straightConnector1">
+            <a:avLst/>
+          </a:prstGeom>
+          <a:ln w="28575">
+            <a:solidFill>
+              <a:srgbClr val="00B0F0"/>
+            </a:solidFill>
+            <a:tailEnd type="triangle"/>
+          </a:ln>
+        </p:spPr>
+        <p:style>
+          <a:lnRef idx="1">
+            <a:schemeClr val="accent1"/>
+          </a:lnRef>
+          <a:fillRef idx="0">
+            <a:schemeClr val="accent1"/>
+          </a:fillRef>
+          <a:effectRef idx="0">
+            <a:schemeClr val="accent1"/>
+          </a:effectRef>
+          <a:fontRef idx="minor">
+            <a:schemeClr val="tx1"/>
+          </a:fontRef>
+        </p:style>
+      </p:cxnSp>
+      <p:sp>
+        <p:nvSpPr>
+          <p:cNvPr id="74" name="Rettangolo con angoli arrotondati 73">
+            <a:extLst>
+              <a:ext uri="{FF2B5EF4-FFF2-40B4-BE49-F238E27FC236}">
+                <a16:creationId xmlns:a16="http://schemas.microsoft.com/office/drawing/2014/main" id="{5BD6FCF5-852F-E83C-FB49-8F328511CD32}"/>
+              </a:ext>
+            </a:extLst>
+          </p:cNvPr>
+          <p:cNvSpPr/>
+          <p:nvPr/>
+        </p:nvSpPr>
+        <p:spPr>
+          <a:xfrm>
+            <a:off x="8259580" y="4411673"/>
+            <a:ext cx="1381089" cy="400959"/>
+          </a:xfrm>
+          <a:prstGeom prst="roundRect">
+            <a:avLst/>
+          </a:prstGeom>
+          <a:solidFill>
+            <a:schemeClr val="accent6"/>
+          </a:solidFill>
+        </p:spPr>
+        <p:style>
+          <a:lnRef idx="2">
+            <a:schemeClr val="accent1">
+              <a:shade val="50000"/>
+            </a:schemeClr>
+          </a:lnRef>
+          <a:fillRef idx="1">
+            <a:schemeClr val="accent1"/>
+          </a:fillRef>
+          <a:effectRef idx="0">
+            <a:schemeClr val="accent1"/>
+          </a:effectRef>
+          <a:fontRef idx="minor">
+            <a:schemeClr val="lt1"/>
+          </a:fontRef>
+        </p:style>
+        <p:txBody>
+          <a:bodyPr rtlCol="0" anchor="ctr"/>
+          <a:lstStyle/>
+          <a:p>
+            <a:r>
+              <a:rPr lang="en-GB" sz="1463" dirty="0"/>
+              <a:t>Stars</a:t>
+            </a:r>
+          </a:p>
+        </p:txBody>
+      </p:sp>
+      <p:cxnSp>
+        <p:nvCxnSpPr>
+          <p:cNvPr id="75" name="Connettore 2 74">
+            <a:extLst>
+              <a:ext uri="{FF2B5EF4-FFF2-40B4-BE49-F238E27FC236}">
+                <a16:creationId xmlns:a16="http://schemas.microsoft.com/office/drawing/2014/main" id="{8BE2EF35-0CB7-CCA6-29B2-5BB301D3EEE4}"/>
+              </a:ext>
+            </a:extLst>
+          </p:cNvPr>
+          <p:cNvCxnSpPr>
+            <a:cxnSpLocks/>
+          </p:cNvCxnSpPr>
+          <p:nvPr/>
+        </p:nvCxnSpPr>
+        <p:spPr>
+          <a:xfrm flipH="1">
+            <a:off x="7862367" y="5058429"/>
+            <a:ext cx="359619" cy="0"/>
+          </a:xfrm>
+          <a:prstGeom prst="straightConnector1">
+            <a:avLst/>
+          </a:prstGeom>
+          <a:ln w="28575">
+            <a:solidFill>
+              <a:schemeClr val="accent4"/>
+            </a:solidFill>
+            <a:tailEnd type="triangle"/>
+          </a:ln>
+        </p:spPr>
+        <p:style>
+          <a:lnRef idx="1">
+            <a:schemeClr val="accent1"/>
+          </a:lnRef>
+          <a:fillRef idx="0">
+            <a:schemeClr val="accent1"/>
+          </a:fillRef>
+          <a:effectRef idx="0">
+            <a:schemeClr val="accent1"/>
+          </a:effectRef>
+          <a:fontRef idx="minor">
+            <a:schemeClr val="tx1"/>
+          </a:fontRef>
+        </p:style>
+      </p:cxnSp>
+      <p:pic>
+        <p:nvPicPr>
+          <p:cNvPr id="82" name="Elemento grafico 81" descr="Valutazione in stelle con riempimento a tinta unita">
+            <a:extLst>
+              <a:ext uri="{FF2B5EF4-FFF2-40B4-BE49-F238E27FC236}">
+                <a16:creationId xmlns:a16="http://schemas.microsoft.com/office/drawing/2014/main" id="{9B4A6848-0ADD-9E96-37D8-726FCF453495}"/>
+              </a:ext>
+            </a:extLst>
+          </p:cNvPr>
+          <p:cNvPicPr>
+            <a:picLocks noChangeAspect="1"/>
+          </p:cNvPicPr>
+          <p:nvPr/>
+        </p:nvPicPr>
+        <p:blipFill>
+          <a:blip r:embed="rId6">
+            <a:extLst>
+              <a:ext uri="{96DAC541-7B7A-43D3-8B79-37D633B846F1}">
+                <asvg:svgBlip xmlns:asvg="http://schemas.microsoft.com/office/drawing/2016/SVG/main" r:embed="rId7"/>
+              </a:ext>
+            </a:extLst>
+          </a:blip>
+          <a:stretch>
+            <a:fillRect/>
+          </a:stretch>
+        </p:blipFill>
+        <p:spPr>
+          <a:xfrm>
+            <a:off x="8802469" y="4227897"/>
+            <a:ext cx="742950" cy="742950"/>
+          </a:xfrm>
+          <a:prstGeom prst="rect">
+            <a:avLst/>
+          </a:prstGeom>
+        </p:spPr>
+      </p:pic>
+      <p:pic>
+        <p:nvPicPr>
+          <p:cNvPr id="88" name="Elemento grafico 87" descr="Diagramma di Gantt con riempimento a tinta unita">
+            <a:extLst>
+              <a:ext uri="{FF2B5EF4-FFF2-40B4-BE49-F238E27FC236}">
+                <a16:creationId xmlns:a16="http://schemas.microsoft.com/office/drawing/2014/main" id="{7057CF94-EEA1-7EE4-0AF3-00EAADDA08F7}"/>
+              </a:ext>
+            </a:extLst>
+          </p:cNvPr>
+          <p:cNvPicPr>
+            <a:picLocks noChangeAspect="1"/>
+          </p:cNvPicPr>
+          <p:nvPr/>
+        </p:nvPicPr>
+        <p:blipFill>
+          <a:blip r:embed="rId8">
+            <a:extLst>
+              <a:ext uri="{96DAC541-7B7A-43D3-8B79-37D633B846F1}">
+                <asvg:svgBlip xmlns:asvg="http://schemas.microsoft.com/office/drawing/2016/SVG/main" r:embed="rId9"/>
+              </a:ext>
+            </a:extLst>
+          </a:blip>
+          <a:stretch>
+            <a:fillRect/>
+          </a:stretch>
+        </p:blipFill>
+        <p:spPr>
+          <a:xfrm>
+            <a:off x="3809390" y="2795984"/>
+            <a:ext cx="445383" cy="445383"/>
+          </a:xfrm>
+          <a:prstGeom prst="rect">
+            <a:avLst/>
+          </a:prstGeom>
+        </p:spPr>
+      </p:pic>
+      <p:pic>
+        <p:nvPicPr>
+          <p:cNvPr id="90" name="Elemento grafico 89" descr="Cronometro contorno">
+            <a:extLst>
+              <a:ext uri="{FF2B5EF4-FFF2-40B4-BE49-F238E27FC236}">
+                <a16:creationId xmlns:a16="http://schemas.microsoft.com/office/drawing/2014/main" id="{B0EF5BB8-AC97-2442-906C-490880C784D1}"/>
+              </a:ext>
+            </a:extLst>
+          </p:cNvPr>
+          <p:cNvPicPr>
+            <a:picLocks noChangeAspect="1"/>
+          </p:cNvPicPr>
+          <p:nvPr/>
+        </p:nvPicPr>
+        <p:blipFill>
+          <a:blip r:embed="rId10">
+            <a:extLst>
+              <a:ext uri="{96DAC541-7B7A-43D3-8B79-37D633B846F1}">
+                <asvg:svgBlip xmlns:asvg="http://schemas.microsoft.com/office/drawing/2016/SVG/main" r:embed="rId11"/>
+              </a:ext>
+            </a:extLst>
+          </a:blip>
+          <a:stretch>
+            <a:fillRect/>
+          </a:stretch>
+        </p:blipFill>
+        <p:spPr>
+          <a:xfrm>
+            <a:off x="5366284" y="2819270"/>
+            <a:ext cx="434691" cy="434691"/>
+          </a:xfrm>
+          <a:prstGeom prst="rect">
+            <a:avLst/>
+          </a:prstGeom>
+        </p:spPr>
+      </p:pic>
+      <p:sp>
+        <p:nvSpPr>
+          <p:cNvPr id="93" name="Rettangolo con angoli arrotondati 92">
+            <a:extLst>
+              <a:ext uri="{FF2B5EF4-FFF2-40B4-BE49-F238E27FC236}">
+                <a16:creationId xmlns:a16="http://schemas.microsoft.com/office/drawing/2014/main" id="{CF209D71-0074-BDF9-9BCE-E8991008DFFD}"/>
+              </a:ext>
+            </a:extLst>
+          </p:cNvPr>
+          <p:cNvSpPr/>
+          <p:nvPr/>
+        </p:nvSpPr>
+        <p:spPr>
+          <a:xfrm>
+            <a:off x="2472889" y="1842320"/>
+            <a:ext cx="7280711" cy="4863280"/>
+          </a:xfrm>
+          <a:prstGeom prst="roundRect">
+            <a:avLst/>
+          </a:prstGeom>
+          <a:noFill/>
+          <a:ln w="38100"/>
+        </p:spPr>
+        <p:style>
+          <a:lnRef idx="2">
+            <a:schemeClr val="accent1">
+              <a:shade val="50000"/>
+            </a:schemeClr>
+          </a:lnRef>
+          <a:fillRef idx="1">
+            <a:schemeClr val="accent1"/>
+          </a:fillRef>
+          <a:effectRef idx="0">
+            <a:schemeClr val="accent1"/>
+          </a:effectRef>
+          <a:fontRef idx="minor">
+            <a:schemeClr val="lt1"/>
+          </a:fontRef>
+        </p:style>
+        <p:txBody>
+          <a:bodyPr rtlCol="0" anchor="ctr"/>
+          <a:lstStyle/>
+          <a:p>
+            <a:pPr algn="ctr"/>
+            <a:endParaRPr lang="en-GB" sz="1463" dirty="0"/>
+          </a:p>
+        </p:txBody>
+      </p:sp>
+      <p:pic>
+        <p:nvPicPr>
+          <p:cNvPr id="94" name="Immagine 93">
+            <a:extLst>
+              <a:ext uri="{FF2B5EF4-FFF2-40B4-BE49-F238E27FC236}">
+                <a16:creationId xmlns:a16="http://schemas.microsoft.com/office/drawing/2014/main" id="{27B27B60-D4F3-261A-79D8-A35EB9D1C31E}"/>
+              </a:ext>
+            </a:extLst>
+          </p:cNvPr>
+          <p:cNvPicPr>
+            <a:picLocks noChangeAspect="1"/>
+          </p:cNvPicPr>
+          <p:nvPr/>
+        </p:nvPicPr>
+        <p:blipFill>
+          <a:blip r:embed="rId12"/>
+          <a:stretch>
+            <a:fillRect/>
+          </a:stretch>
+        </p:blipFill>
+        <p:spPr>
+          <a:xfrm>
+            <a:off x="7879954" y="6308834"/>
+            <a:ext cx="1283302" cy="304785"/>
+          </a:xfrm>
+          <a:prstGeom prst="rect">
+            <a:avLst/>
+          </a:prstGeom>
+        </p:spPr>
+      </p:pic>
+      <p:sp>
+        <p:nvSpPr>
+          <p:cNvPr id="105" name="Rettangolo con angoli arrotondati 104">
+            <a:extLst>
+              <a:ext uri="{FF2B5EF4-FFF2-40B4-BE49-F238E27FC236}">
+                <a16:creationId xmlns:a16="http://schemas.microsoft.com/office/drawing/2014/main" id="{849C8E0C-9B9D-7921-C2CB-43B1969E1B73}"/>
+              </a:ext>
+            </a:extLst>
+          </p:cNvPr>
+          <p:cNvSpPr/>
+          <p:nvPr/>
+        </p:nvSpPr>
+        <p:spPr>
+          <a:xfrm>
+            <a:off x="288470" y="1911719"/>
+            <a:ext cx="1630699" cy="2348768"/>
+          </a:xfrm>
+          <a:prstGeom prst="roundRect">
+            <a:avLst/>
+          </a:prstGeom>
+          <a:noFill/>
+          <a:ln w="28575"/>
+        </p:spPr>
+        <p:style>
+          <a:lnRef idx="2">
+            <a:schemeClr val="accent1">
+              <a:shade val="50000"/>
+            </a:schemeClr>
+          </a:lnRef>
+          <a:fillRef idx="1">
+            <a:schemeClr val="accent1"/>
+          </a:fillRef>
+          <a:effectRef idx="0">
+            <a:schemeClr val="accent1"/>
+          </a:effectRef>
+          <a:fontRef idx="minor">
+            <a:schemeClr val="lt1"/>
+          </a:fontRef>
+        </p:style>
+        <p:txBody>
+          <a:bodyPr rtlCol="0" anchor="ctr"/>
+          <a:lstStyle/>
+          <a:p>
+            <a:pPr algn="ctr"/>
+            <a:endParaRPr lang="en-GB" sz="1463" dirty="0">
+              <a:solidFill>
+                <a:srgbClr val="FFFF00"/>
+              </a:solidFill>
+            </a:endParaRPr>
+          </a:p>
+        </p:txBody>
+      </p:sp>
+      <p:pic>
+        <p:nvPicPr>
+          <p:cNvPr id="108" name="Elemento grafico 107" descr="Smartphone con riempimento a tinta unita">
+            <a:extLst>
+              <a:ext uri="{FF2B5EF4-FFF2-40B4-BE49-F238E27FC236}">
+                <a16:creationId xmlns:a16="http://schemas.microsoft.com/office/drawing/2014/main" id="{BF51F678-7AAC-BEDC-9448-C35C92186E01}"/>
+              </a:ext>
+            </a:extLst>
+          </p:cNvPr>
+          <p:cNvPicPr>
+            <a:picLocks noChangeAspect="1"/>
+          </p:cNvPicPr>
+          <p:nvPr/>
+        </p:nvPicPr>
+        <p:blipFill>
+          <a:blip r:embed="rId13">
+            <a:extLst>
+              <a:ext uri="{96DAC541-7B7A-43D3-8B79-37D633B846F1}">
+                <asvg:svgBlip xmlns:asvg="http://schemas.microsoft.com/office/drawing/2016/SVG/main" r:embed="rId14"/>
+              </a:ext>
+            </a:extLst>
+          </a:blip>
+          <a:stretch>
+            <a:fillRect/>
+          </a:stretch>
+        </p:blipFill>
+        <p:spPr>
+          <a:xfrm flipH="1">
+            <a:off x="451900" y="1435844"/>
+            <a:ext cx="348766" cy="348766"/>
+          </a:xfrm>
+          <a:prstGeom prst="rect">
+            <a:avLst/>
+          </a:prstGeom>
+        </p:spPr>
+      </p:pic>
+      <p:pic>
+        <p:nvPicPr>
+          <p:cNvPr id="110" name="Elemento grafico 109" descr="Portatile con riempimento a tinta unita">
+            <a:extLst>
+              <a:ext uri="{FF2B5EF4-FFF2-40B4-BE49-F238E27FC236}">
+                <a16:creationId xmlns:a16="http://schemas.microsoft.com/office/drawing/2014/main" id="{8066E5AB-DD63-52A4-9316-B0F5451501A0}"/>
+              </a:ext>
+            </a:extLst>
+          </p:cNvPr>
+          <p:cNvPicPr>
+            <a:picLocks noChangeAspect="1"/>
+          </p:cNvPicPr>
+          <p:nvPr/>
+        </p:nvPicPr>
+        <p:blipFill>
+          <a:blip r:embed="rId15">
+            <a:extLst>
+              <a:ext uri="{96DAC541-7B7A-43D3-8B79-37D633B846F1}">
+                <asvg:svgBlip xmlns:asvg="http://schemas.microsoft.com/office/drawing/2016/SVG/main" r:embed="rId16"/>
+              </a:ext>
+            </a:extLst>
+          </a:blip>
+          <a:stretch>
+            <a:fillRect/>
+          </a:stretch>
+        </p:blipFill>
+        <p:spPr>
+          <a:xfrm flipH="1">
+            <a:off x="1235687" y="1474994"/>
+            <a:ext cx="348766" cy="348766"/>
+          </a:xfrm>
+          <a:prstGeom prst="rect">
+            <a:avLst/>
+          </a:prstGeom>
+        </p:spPr>
+      </p:pic>
+      <p:pic>
+        <p:nvPicPr>
+          <p:cNvPr id="112" name="Elemento grafico 111" descr="Computer con riempimento a tinta unita">
+            <a:extLst>
+              <a:ext uri="{FF2B5EF4-FFF2-40B4-BE49-F238E27FC236}">
+                <a16:creationId xmlns:a16="http://schemas.microsoft.com/office/drawing/2014/main" id="{3E071E82-2D96-6483-5B81-5769B9F3376C}"/>
+              </a:ext>
+            </a:extLst>
+          </p:cNvPr>
+          <p:cNvPicPr>
+            <a:picLocks noChangeAspect="1"/>
+          </p:cNvPicPr>
+          <p:nvPr/>
+        </p:nvPicPr>
+        <p:blipFill>
+          <a:blip r:embed="rId17">
+            <a:extLst>
+              <a:ext uri="{96DAC541-7B7A-43D3-8B79-37D633B846F1}">
+                <asvg:svgBlip xmlns:asvg="http://schemas.microsoft.com/office/drawing/2016/SVG/main" r:embed="rId18"/>
+              </a:ext>
+            </a:extLst>
+          </a:blip>
+          <a:stretch>
+            <a:fillRect/>
+          </a:stretch>
+        </p:blipFill>
+        <p:spPr>
+          <a:xfrm flipH="1">
+            <a:off x="832711" y="1474994"/>
+            <a:ext cx="348766" cy="348766"/>
+          </a:xfrm>
+          <a:prstGeom prst="rect">
+            <a:avLst/>
+          </a:prstGeom>
+        </p:spPr>
+      </p:pic>
+      <p:pic>
+        <p:nvPicPr>
+          <p:cNvPr id="57" name="Immagine 56">
+            <a:extLst>
+              <a:ext uri="{FF2B5EF4-FFF2-40B4-BE49-F238E27FC236}">
+                <a16:creationId xmlns:a16="http://schemas.microsoft.com/office/drawing/2014/main" id="{A9B2CC82-0CCA-840B-5E98-3020E8F3DB47}"/>
+              </a:ext>
+            </a:extLst>
+          </p:cNvPr>
+          <p:cNvPicPr>
+            <a:picLocks noChangeAspect="1"/>
+          </p:cNvPicPr>
+          <p:nvPr/>
+        </p:nvPicPr>
+        <p:blipFill>
+          <a:blip r:embed="rId19">
+            <a:extLst>
+              <a:ext uri="{28A0092B-C50C-407E-A947-70E740481C1C}">
+                <a14:useLocalDpi xmlns:a14="http://schemas.microsoft.com/office/drawing/2010/main" val="0"/>
+              </a:ext>
+            </a:extLst>
+          </a:blip>
+          <a:stretch>
+            <a:fillRect/>
+          </a:stretch>
+        </p:blipFill>
+        <p:spPr>
+          <a:xfrm>
+            <a:off x="431372" y="2409716"/>
+            <a:ext cx="1356979" cy="1703442"/>
+          </a:xfrm>
+          <a:prstGeom prst="rect">
+            <a:avLst/>
+          </a:prstGeom>
+        </p:spPr>
+      </p:pic>
+      <p:pic>
+        <p:nvPicPr>
+          <p:cNvPr id="60" name="Immagine 59">
+            <a:extLst>
+              <a:ext uri="{FF2B5EF4-FFF2-40B4-BE49-F238E27FC236}">
+                <a16:creationId xmlns:a16="http://schemas.microsoft.com/office/drawing/2014/main" id="{D1D4664E-D40D-FAFE-C781-C7B20C2181A6}"/>
+              </a:ext>
+            </a:extLst>
+          </p:cNvPr>
+          <p:cNvPicPr>
+            <a:picLocks noChangeAspect="1"/>
+          </p:cNvPicPr>
+          <p:nvPr/>
+        </p:nvPicPr>
+        <p:blipFill>
+          <a:blip r:embed="rId20"/>
+          <a:stretch>
+            <a:fillRect/>
+          </a:stretch>
+        </p:blipFill>
+        <p:spPr>
+          <a:xfrm>
+            <a:off x="451073" y="2084694"/>
+            <a:ext cx="1286196" cy="248822"/>
+          </a:xfrm>
+          <a:prstGeom prst="rect">
+            <a:avLst/>
+          </a:prstGeom>
+        </p:spPr>
+      </p:pic>
+      <p:pic>
+        <p:nvPicPr>
+          <p:cNvPr id="3" name="Elemento grafico 2" descr="Intelligenza artificiale contorno">
+            <a:extLst>
+              <a:ext uri="{FF2B5EF4-FFF2-40B4-BE49-F238E27FC236}">
+                <a16:creationId xmlns:a16="http://schemas.microsoft.com/office/drawing/2014/main" id="{A80CAA3E-8046-340B-4DC7-A4CBB4869B79}"/>
+              </a:ext>
+            </a:extLst>
+          </p:cNvPr>
+          <p:cNvPicPr>
+            <a:picLocks noChangeAspect="1"/>
+          </p:cNvPicPr>
+          <p:nvPr/>
+        </p:nvPicPr>
+        <p:blipFill>
+          <a:blip r:embed="rId21">
+            <a:extLst>
+              <a:ext uri="{96DAC541-7B7A-43D3-8B79-37D633B846F1}">
+                <asvg:svgBlip xmlns:asvg="http://schemas.microsoft.com/office/drawing/2016/SVG/main" r:embed="rId22"/>
+              </a:ext>
+            </a:extLst>
+          </a:blip>
+          <a:stretch>
+            <a:fillRect/>
+          </a:stretch>
+        </p:blipFill>
+        <p:spPr>
+          <a:xfrm>
+            <a:off x="9236168" y="4996408"/>
+            <a:ext cx="327576" cy="327576"/>
+          </a:xfrm>
+          <a:prstGeom prst="rect">
+            <a:avLst/>
+          </a:prstGeom>
+        </p:spPr>
+      </p:pic>
+      <p:sp>
+        <p:nvSpPr>
+          <p:cNvPr id="64" name="Rettangolo con angoli arrotondati 63">
+            <a:extLst>
+              <a:ext uri="{FF2B5EF4-FFF2-40B4-BE49-F238E27FC236}">
+                <a16:creationId xmlns:a16="http://schemas.microsoft.com/office/drawing/2014/main" id="{D787AA55-C671-301E-BD93-DFA4BCCEC9E4}"/>
+              </a:ext>
+            </a:extLst>
+          </p:cNvPr>
+          <p:cNvSpPr/>
+          <p:nvPr/>
+        </p:nvSpPr>
+        <p:spPr>
+          <a:xfrm>
+            <a:off x="451880" y="4647003"/>
+            <a:ext cx="1260995" cy="455580"/>
+          </a:xfrm>
+          <a:prstGeom prst="roundRect">
+            <a:avLst/>
+          </a:prstGeom>
+          <a:solidFill>
+            <a:schemeClr val="accent2"/>
+          </a:solidFill>
+          <a:ln>
+            <a:solidFill>
+              <a:schemeClr val="accent4"/>
+            </a:solidFill>
+          </a:ln>
+        </p:spPr>
+        <p:style>
+          <a:lnRef idx="2">
+            <a:schemeClr val="accent1">
+              <a:shade val="50000"/>
+            </a:schemeClr>
+          </a:lnRef>
+          <a:fillRef idx="1">
+            <a:schemeClr val="accent1"/>
+          </a:fillRef>
+          <a:effectRef idx="0">
+            <a:schemeClr val="accent1"/>
+          </a:effectRef>
+          <a:fontRef idx="minor">
+            <a:schemeClr val="lt1"/>
+          </a:fontRef>
+        </p:style>
+        <p:txBody>
+          <a:bodyPr rtlCol="0" anchor="ctr"/>
+          <a:lstStyle/>
+          <a:p>
+            <a:pPr algn="ctr"/>
+            <a:r>
+              <a:rPr lang="en-GB" sz="1463" dirty="0"/>
+              <a:t>AW Adapter</a:t>
+            </a:r>
+          </a:p>
+        </p:txBody>
+      </p:sp>
+      <p:sp>
+        <p:nvSpPr>
+          <p:cNvPr id="73" name="Rettangolo con angoli arrotondati 72">
+            <a:extLst>
+              <a:ext uri="{FF2B5EF4-FFF2-40B4-BE49-F238E27FC236}">
+                <a16:creationId xmlns:a16="http://schemas.microsoft.com/office/drawing/2014/main" id="{E7617A4E-9197-B653-347C-7D9A0AA97279}"/>
+              </a:ext>
+            </a:extLst>
+          </p:cNvPr>
+          <p:cNvSpPr/>
+          <p:nvPr/>
+        </p:nvSpPr>
+        <p:spPr>
+          <a:xfrm>
+            <a:off x="7620000" y="2055418"/>
+            <a:ext cx="1152973" cy="1239325"/>
+          </a:xfrm>
+          <a:prstGeom prst="roundRect">
+            <a:avLst/>
+          </a:prstGeom>
+          <a:ln>
+            <a:solidFill>
+              <a:schemeClr val="accent4"/>
+            </a:solidFill>
+          </a:ln>
+        </p:spPr>
+        <p:style>
+          <a:lnRef idx="2">
+            <a:schemeClr val="accent1">
+              <a:shade val="50000"/>
+            </a:schemeClr>
+          </a:lnRef>
+          <a:fillRef idx="1">
+            <a:schemeClr val="accent1"/>
+          </a:fillRef>
+          <a:effectRef idx="0">
+            <a:schemeClr val="accent1"/>
+          </a:effectRef>
+          <a:fontRef idx="minor">
+            <a:schemeClr val="lt1"/>
+          </a:fontRef>
+        </p:style>
+        <p:txBody>
+          <a:bodyPr rtlCol="0" anchor="t"/>
+          <a:lstStyle/>
+          <a:p>
+            <a:pPr algn="ctr"/>
+            <a:r>
+              <a:rPr lang="en-GB" sz="1463" dirty="0"/>
+              <a:t>Ontochain Adapter</a:t>
+            </a:r>
+          </a:p>
+        </p:txBody>
+      </p:sp>
+      <p:sp>
+        <p:nvSpPr>
+          <p:cNvPr id="85" name="Rettangolo con angoli arrotondati 84">
+            <a:extLst>
+              <a:ext uri="{FF2B5EF4-FFF2-40B4-BE49-F238E27FC236}">
+                <a16:creationId xmlns:a16="http://schemas.microsoft.com/office/drawing/2014/main" id="{7EDB54A1-6D22-6A42-4598-F5D4D15FD01C}"/>
+              </a:ext>
+            </a:extLst>
+          </p:cNvPr>
+          <p:cNvSpPr/>
+          <p:nvPr/>
+        </p:nvSpPr>
+        <p:spPr>
+          <a:xfrm>
+            <a:off x="3363483" y="1178994"/>
+            <a:ext cx="5731370" cy="502152"/>
+          </a:xfrm>
+          <a:prstGeom prst="roundRect">
+            <a:avLst/>
+          </a:prstGeom>
+          <a:noFill/>
+          <a:ln w="38100"/>
+        </p:spPr>
+        <p:style>
+          <a:lnRef idx="2">
+            <a:schemeClr val="accent1">
+              <a:shade val="50000"/>
+            </a:schemeClr>
+          </a:lnRef>
+          <a:fillRef idx="1">
+            <a:schemeClr val="accent1"/>
+          </a:fillRef>
+          <a:effectRef idx="0">
+            <a:schemeClr val="accent1"/>
+          </a:effectRef>
+          <a:fontRef idx="minor">
+            <a:schemeClr val="lt1"/>
+          </a:fontRef>
+        </p:style>
+        <p:txBody>
+          <a:bodyPr rtlCol="0" anchor="ctr"/>
+          <a:lstStyle/>
+          <a:p>
+            <a:pPr algn="ctr"/>
+            <a:endParaRPr lang="en-GB" sz="1463" dirty="0"/>
+          </a:p>
+        </p:txBody>
+      </p:sp>
+      <p:pic>
+        <p:nvPicPr>
+          <p:cNvPr id="48" name="Elemento grafico 47" descr="Ragnatela con riempimento a tinta unita">
+            <a:extLst>
+              <a:ext uri="{FF2B5EF4-FFF2-40B4-BE49-F238E27FC236}">
+                <a16:creationId xmlns:a16="http://schemas.microsoft.com/office/drawing/2014/main" id="{930F2C65-6EFB-86C5-3987-1D6FD32D67AB}"/>
+              </a:ext>
+            </a:extLst>
+          </p:cNvPr>
+          <p:cNvPicPr>
+            <a:picLocks noChangeAspect="1"/>
+          </p:cNvPicPr>
+          <p:nvPr/>
+        </p:nvPicPr>
+        <p:blipFill>
+          <a:blip r:embed="rId23">
+            <a:extLst>
+              <a:ext uri="{96DAC541-7B7A-43D3-8B79-37D633B846F1}">
+                <asvg:svgBlip xmlns:asvg="http://schemas.microsoft.com/office/drawing/2016/SVG/main" r:embed="rId24"/>
+              </a:ext>
+            </a:extLst>
+          </a:blip>
+          <a:stretch>
+            <a:fillRect/>
+          </a:stretch>
+        </p:blipFill>
+        <p:spPr>
+          <a:xfrm>
+            <a:off x="7375070" y="1233338"/>
+            <a:ext cx="416039" cy="416039"/>
+          </a:xfrm>
+          <a:prstGeom prst="rect">
+            <a:avLst/>
+          </a:prstGeom>
+        </p:spPr>
+      </p:pic>
+      <p:sp>
+        <p:nvSpPr>
+          <p:cNvPr id="49" name="CasellaDiTesto 48">
+            <a:extLst>
+              <a:ext uri="{FF2B5EF4-FFF2-40B4-BE49-F238E27FC236}">
+                <a16:creationId xmlns:a16="http://schemas.microsoft.com/office/drawing/2014/main" id="{AC7372CF-F7F6-82DE-FE67-09BA4D43461A}"/>
+              </a:ext>
+            </a:extLst>
+          </p:cNvPr>
+          <p:cNvSpPr txBox="1"/>
+          <p:nvPr/>
+        </p:nvSpPr>
+        <p:spPr>
+          <a:xfrm>
+            <a:off x="7720525" y="1280029"/>
+            <a:ext cx="1222194" cy="317459"/>
+          </a:xfrm>
+          <a:prstGeom prst="rect">
+            <a:avLst/>
+          </a:prstGeom>
+          <a:noFill/>
+        </p:spPr>
+        <p:txBody>
+          <a:bodyPr wrap="none" rtlCol="0">
+            <a:spAutoFit/>
+          </a:bodyPr>
+          <a:lstStyle/>
+          <a:p>
+            <a:r>
+              <a:rPr lang="en-GB" sz="1463" b="1" dirty="0"/>
+              <a:t>My2SecDApp</a:t>
+            </a:r>
+          </a:p>
+        </p:txBody>
+      </p:sp>
+      <p:pic>
+        <p:nvPicPr>
+          <p:cNvPr id="95" name="Elemento grafico 94" descr="Successo di gruppo contorno">
+            <a:extLst>
+              <a:ext uri="{FF2B5EF4-FFF2-40B4-BE49-F238E27FC236}">
+                <a16:creationId xmlns:a16="http://schemas.microsoft.com/office/drawing/2014/main" id="{729AD5F6-44FE-9B0D-7BE6-0F2FF684D27F}"/>
+              </a:ext>
+            </a:extLst>
+          </p:cNvPr>
+          <p:cNvPicPr>
+            <a:picLocks noChangeAspect="1"/>
+          </p:cNvPicPr>
+          <p:nvPr/>
+        </p:nvPicPr>
+        <p:blipFill>
+          <a:blip r:embed="rId25">
+            <a:extLst>
+              <a:ext uri="{28A0092B-C50C-407E-A947-70E740481C1C}">
+                <a14:useLocalDpi xmlns:a14="http://schemas.microsoft.com/office/drawing/2010/main" val="0"/>
+              </a:ext>
+              <a:ext uri="{96DAC541-7B7A-43D3-8B79-37D633B846F1}">
+                <asvg:svgBlip xmlns:asvg="http://schemas.microsoft.com/office/drawing/2016/SVG/main" r:embed="rId26"/>
+              </a:ext>
+            </a:extLst>
+          </a:blip>
+          <a:stretch>
+            <a:fillRect/>
+          </a:stretch>
+        </p:blipFill>
+        <p:spPr>
+          <a:xfrm>
+            <a:off x="499431" y="372647"/>
+            <a:ext cx="1056919" cy="1056919"/>
+          </a:xfrm>
+          <a:prstGeom prst="rect">
+            <a:avLst/>
+          </a:prstGeom>
+        </p:spPr>
+      </p:pic>
+      <p:sp>
+        <p:nvSpPr>
+          <p:cNvPr id="99" name="CasellaDiTesto 98">
+            <a:extLst>
+              <a:ext uri="{FF2B5EF4-FFF2-40B4-BE49-F238E27FC236}">
+                <a16:creationId xmlns:a16="http://schemas.microsoft.com/office/drawing/2014/main" id="{B05DE287-5D96-E3AD-6B5B-C5716F059D0C}"/>
+              </a:ext>
+            </a:extLst>
+          </p:cNvPr>
+          <p:cNvSpPr txBox="1"/>
+          <p:nvPr/>
+        </p:nvSpPr>
+        <p:spPr>
+          <a:xfrm>
+            <a:off x="313543" y="138594"/>
+            <a:ext cx="1675459" cy="317459"/>
+          </a:xfrm>
+          <a:prstGeom prst="rect">
+            <a:avLst/>
+          </a:prstGeom>
+          <a:noFill/>
+        </p:spPr>
+        <p:txBody>
+          <a:bodyPr wrap="none" rtlCol="0">
+            <a:spAutoFit/>
+          </a:bodyPr>
+          <a:lstStyle/>
+          <a:p>
+            <a:r>
+              <a:rPr lang="it-IT" sz="1463" b="1" dirty="0">
+                <a:solidFill>
+                  <a:schemeClr val="accent1"/>
+                </a:solidFill>
+                <a:latin typeface="Montserrat" pitchFamily="2" charset="77"/>
+              </a:rPr>
+              <a:t>Smart Workers</a:t>
+            </a:r>
+          </a:p>
+        </p:txBody>
+      </p:sp>
+      <p:pic>
+        <p:nvPicPr>
+          <p:cNvPr id="117" name="Immagine 116">
+            <a:extLst>
+              <a:ext uri="{FF2B5EF4-FFF2-40B4-BE49-F238E27FC236}">
+                <a16:creationId xmlns:a16="http://schemas.microsoft.com/office/drawing/2014/main" id="{1174FB36-DAE8-5977-2D68-6DEAFE72251D}"/>
+              </a:ext>
+            </a:extLst>
+          </p:cNvPr>
+          <p:cNvPicPr>
+            <a:picLocks noChangeAspect="1"/>
+          </p:cNvPicPr>
+          <p:nvPr/>
+        </p:nvPicPr>
+        <p:blipFill>
+          <a:blip r:embed="rId27"/>
+          <a:stretch>
+            <a:fillRect/>
+          </a:stretch>
+        </p:blipFill>
+        <p:spPr>
+          <a:xfrm>
+            <a:off x="5527591" y="1604697"/>
+            <a:ext cx="546768" cy="546768"/>
+          </a:xfrm>
+          <a:prstGeom prst="rect">
+            <a:avLst/>
+          </a:prstGeom>
+        </p:spPr>
+      </p:pic>
+      <p:sp>
+        <p:nvSpPr>
+          <p:cNvPr id="121" name="CasellaDiTesto 120">
+            <a:extLst>
+              <a:ext uri="{FF2B5EF4-FFF2-40B4-BE49-F238E27FC236}">
+                <a16:creationId xmlns:a16="http://schemas.microsoft.com/office/drawing/2014/main" id="{CF20300E-589F-D470-A41D-CA08BF2A8D17}"/>
+              </a:ext>
+            </a:extLst>
+          </p:cNvPr>
+          <p:cNvSpPr txBox="1"/>
+          <p:nvPr/>
+        </p:nvSpPr>
+        <p:spPr>
+          <a:xfrm>
+            <a:off x="3906559" y="142321"/>
+            <a:ext cx="742951" cy="317459"/>
+          </a:xfrm>
+          <a:prstGeom prst="rect">
+            <a:avLst/>
+          </a:prstGeom>
+          <a:noFill/>
+        </p:spPr>
+        <p:txBody>
+          <a:bodyPr wrap="square" rtlCol="0">
+            <a:spAutoFit/>
+          </a:bodyPr>
+          <a:lstStyle/>
+          <a:p>
+            <a:r>
+              <a:rPr lang="it-IT" sz="1463" b="1" dirty="0">
+                <a:solidFill>
+                  <a:schemeClr val="accent1"/>
+                </a:solidFill>
+                <a:latin typeface="Montserrat" pitchFamily="2" charset="77"/>
+              </a:rPr>
+              <a:t>PM</a:t>
+            </a:r>
+          </a:p>
+        </p:txBody>
+      </p:sp>
+      <p:pic>
+        <p:nvPicPr>
+          <p:cNvPr id="123" name="Elemento grafico 122" descr="Impiegata con riempimento a tinta unita">
+            <a:extLst>
+              <a:ext uri="{FF2B5EF4-FFF2-40B4-BE49-F238E27FC236}">
+                <a16:creationId xmlns:a16="http://schemas.microsoft.com/office/drawing/2014/main" id="{A728BC3A-60D8-2188-7A23-512161C17209}"/>
+              </a:ext>
+            </a:extLst>
+          </p:cNvPr>
+          <p:cNvPicPr>
+            <a:picLocks noChangeAspect="1"/>
+          </p:cNvPicPr>
+          <p:nvPr/>
+        </p:nvPicPr>
+        <p:blipFill>
+          <a:blip r:embed="rId28">
+            <a:extLst>
+              <a:ext uri="{96DAC541-7B7A-43D3-8B79-37D633B846F1}">
+                <asvg:svgBlip xmlns:asvg="http://schemas.microsoft.com/office/drawing/2016/SVG/main" r:embed="rId29"/>
+              </a:ext>
+            </a:extLst>
+          </a:blip>
+          <a:stretch>
+            <a:fillRect/>
+          </a:stretch>
+        </p:blipFill>
+        <p:spPr>
+          <a:xfrm>
+            <a:off x="7720525" y="425313"/>
+            <a:ext cx="742950" cy="742950"/>
+          </a:xfrm>
+          <a:prstGeom prst="rect">
+            <a:avLst/>
+          </a:prstGeom>
+        </p:spPr>
+      </p:pic>
+      <p:pic>
+        <p:nvPicPr>
+          <p:cNvPr id="125" name="Elemento grafico 124" descr="Programmatrice con riempimento a tinta unita">
+            <a:extLst>
+              <a:ext uri="{FF2B5EF4-FFF2-40B4-BE49-F238E27FC236}">
+                <a16:creationId xmlns:a16="http://schemas.microsoft.com/office/drawing/2014/main" id="{24A9C8DB-004C-5382-CD8F-A225E61E620E}"/>
+              </a:ext>
+            </a:extLst>
+          </p:cNvPr>
+          <p:cNvPicPr>
+            <a:picLocks noChangeAspect="1"/>
+          </p:cNvPicPr>
+          <p:nvPr/>
+        </p:nvPicPr>
+        <p:blipFill>
+          <a:blip r:embed="rId30">
+            <a:extLst>
+              <a:ext uri="{96DAC541-7B7A-43D3-8B79-37D633B846F1}">
+                <asvg:svgBlip xmlns:asvg="http://schemas.microsoft.com/office/drawing/2016/SVG/main" r:embed="rId31"/>
+              </a:ext>
+            </a:extLst>
+          </a:blip>
+          <a:stretch>
+            <a:fillRect/>
+          </a:stretch>
+        </p:blipFill>
+        <p:spPr>
+          <a:xfrm>
+            <a:off x="5872480" y="381690"/>
+            <a:ext cx="742950" cy="742950"/>
+          </a:xfrm>
+          <a:prstGeom prst="rect">
+            <a:avLst/>
+          </a:prstGeom>
+        </p:spPr>
+      </p:pic>
+      <p:pic>
+        <p:nvPicPr>
+          <p:cNvPr id="127" name="Elemento grafico 126" descr="Impiegato con riempimento a tinta unita">
+            <a:extLst>
+              <a:ext uri="{FF2B5EF4-FFF2-40B4-BE49-F238E27FC236}">
+                <a16:creationId xmlns:a16="http://schemas.microsoft.com/office/drawing/2014/main" id="{951C8747-5C39-3CC0-D8B2-E8910C4F79C4}"/>
+              </a:ext>
+            </a:extLst>
+          </p:cNvPr>
+          <p:cNvPicPr>
+            <a:picLocks noChangeAspect="1"/>
+          </p:cNvPicPr>
+          <p:nvPr/>
+        </p:nvPicPr>
+        <p:blipFill>
+          <a:blip r:embed="rId32">
+            <a:extLst>
+              <a:ext uri="{96DAC541-7B7A-43D3-8B79-37D633B846F1}">
+                <asvg:svgBlip xmlns:asvg="http://schemas.microsoft.com/office/drawing/2016/SVG/main" r:embed="rId33"/>
+              </a:ext>
+            </a:extLst>
+          </a:blip>
+          <a:stretch>
+            <a:fillRect/>
+          </a:stretch>
+        </p:blipFill>
+        <p:spPr>
+          <a:xfrm>
+            <a:off x="3788684" y="430248"/>
+            <a:ext cx="742950" cy="742950"/>
+          </a:xfrm>
+          <a:prstGeom prst="rect">
+            <a:avLst/>
+          </a:prstGeom>
+        </p:spPr>
+      </p:pic>
+      <p:sp>
+        <p:nvSpPr>
+          <p:cNvPr id="128" name="CasellaDiTesto 127">
+            <a:extLst>
+              <a:ext uri="{FF2B5EF4-FFF2-40B4-BE49-F238E27FC236}">
+                <a16:creationId xmlns:a16="http://schemas.microsoft.com/office/drawing/2014/main" id="{B9E11312-CD06-8EBD-8D11-9E4D6BEBB293}"/>
+              </a:ext>
+            </a:extLst>
+          </p:cNvPr>
+          <p:cNvSpPr txBox="1"/>
+          <p:nvPr/>
+        </p:nvSpPr>
+        <p:spPr>
+          <a:xfrm>
+            <a:off x="5105400" y="139741"/>
+            <a:ext cx="2162943" cy="317459"/>
+          </a:xfrm>
+          <a:prstGeom prst="rect">
+            <a:avLst/>
+          </a:prstGeom>
+          <a:noFill/>
+        </p:spPr>
+        <p:txBody>
+          <a:bodyPr wrap="square" rtlCol="0">
+            <a:spAutoFit/>
+          </a:bodyPr>
+          <a:lstStyle/>
+          <a:p>
+            <a:r>
+              <a:rPr lang="it-IT" sz="1463" b="1" dirty="0">
+                <a:solidFill>
+                  <a:schemeClr val="accent1"/>
+                </a:solidFill>
+                <a:latin typeface="Montserrat" pitchFamily="2" charset="77"/>
+              </a:rPr>
+              <a:t>Data scientists (KPI)</a:t>
+            </a:r>
+          </a:p>
+        </p:txBody>
+      </p:sp>
+      <p:sp>
+        <p:nvSpPr>
+          <p:cNvPr id="129" name="CasellaDiTesto 128">
+            <a:extLst>
+              <a:ext uri="{FF2B5EF4-FFF2-40B4-BE49-F238E27FC236}">
+                <a16:creationId xmlns:a16="http://schemas.microsoft.com/office/drawing/2014/main" id="{B3099D0D-6EB8-E55C-75C2-AB4444B5CFC0}"/>
+              </a:ext>
+            </a:extLst>
+          </p:cNvPr>
+          <p:cNvSpPr txBox="1"/>
+          <p:nvPr/>
+        </p:nvSpPr>
+        <p:spPr>
+          <a:xfrm>
+            <a:off x="7868317" y="128624"/>
+            <a:ext cx="507563" cy="317459"/>
+          </a:xfrm>
+          <a:prstGeom prst="rect">
+            <a:avLst/>
+          </a:prstGeom>
+          <a:noFill/>
+        </p:spPr>
+        <p:txBody>
+          <a:bodyPr wrap="square" rtlCol="0">
+            <a:spAutoFit/>
+          </a:bodyPr>
+          <a:lstStyle/>
+          <a:p>
+            <a:r>
+              <a:rPr lang="it-IT" sz="1463" b="1" dirty="0">
+                <a:solidFill>
+                  <a:schemeClr val="accent1"/>
+                </a:solidFill>
+                <a:latin typeface="Montserrat" pitchFamily="2" charset="77"/>
+              </a:rPr>
+              <a:t>HR</a:t>
+            </a:r>
+          </a:p>
+        </p:txBody>
+      </p:sp>
+      <p:grpSp>
+        <p:nvGrpSpPr>
+          <p:cNvPr id="130" name="Gruppo 129">
+            <a:extLst>
+              <a:ext uri="{FF2B5EF4-FFF2-40B4-BE49-F238E27FC236}">
+                <a16:creationId xmlns:a16="http://schemas.microsoft.com/office/drawing/2014/main" id="{89722132-DAE0-0AEA-CF5E-FC016D680EDA}"/>
+              </a:ext>
+            </a:extLst>
+          </p:cNvPr>
+          <p:cNvGrpSpPr/>
+          <p:nvPr/>
+        </p:nvGrpSpPr>
+        <p:grpSpPr>
+          <a:xfrm rot="19651638">
+            <a:off x="1916785" y="1492435"/>
+            <a:ext cx="1486907" cy="442429"/>
+            <a:chOff x="7788908" y="466854"/>
+            <a:chExt cx="1830039" cy="544528"/>
+          </a:xfrm>
+        </p:grpSpPr>
+        <p:sp>
+          <p:nvSpPr>
+            <p:cNvPr id="131" name="CasellaDiTesto 130">
+              <a:extLst>
+                <a:ext uri="{FF2B5EF4-FFF2-40B4-BE49-F238E27FC236}">
+                  <a16:creationId xmlns:a16="http://schemas.microsoft.com/office/drawing/2014/main" id="{7F9EE925-BA09-3BF6-C5F1-88938616B7D9}"/>
+                </a:ext>
+              </a:extLst>
+            </p:cNvPr>
+            <p:cNvSpPr txBox="1"/>
+            <p:nvPr/>
+          </p:nvSpPr>
+          <p:spPr>
+            <a:xfrm>
+              <a:off x="8225666" y="466854"/>
+              <a:ext cx="1393281" cy="544528"/>
+            </a:xfrm>
+            <a:prstGeom prst="rect">
+              <a:avLst/>
+            </a:prstGeom>
+            <a:noFill/>
+          </p:spPr>
+          <p:txBody>
+            <a:bodyPr wrap="none" rtlCol="0">
+              <a:spAutoFit/>
+            </a:bodyPr>
+            <a:lstStyle/>
+            <a:p>
+              <a:r>
+                <a:rPr lang="it-IT" sz="2275" b="1" dirty="0">
+                  <a:solidFill>
+                    <a:srgbClr val="013D67"/>
+                  </a:solidFill>
+                </a:rPr>
+                <a:t>My2Sec</a:t>
+              </a:r>
+              <a:endParaRPr lang="it-IT" sz="2275" dirty="0">
+                <a:solidFill>
+                  <a:srgbClr val="013D67"/>
+                </a:solidFill>
+              </a:endParaRPr>
+            </a:p>
+          </p:txBody>
+        </p:sp>
+        <p:pic>
+          <p:nvPicPr>
+            <p:cNvPr id="132" name="Google Shape;260;p2">
+              <a:extLst>
+                <a:ext uri="{FF2B5EF4-FFF2-40B4-BE49-F238E27FC236}">
+                  <a16:creationId xmlns:a16="http://schemas.microsoft.com/office/drawing/2014/main" id="{B5F312A4-7185-8E01-4EF2-84D8161CAC4C}"/>
+                </a:ext>
+              </a:extLst>
+            </p:cNvPr>
+            <p:cNvPicPr preferRelativeResize="0">
+              <a:picLocks noChangeAspect="1"/>
+            </p:cNvPicPr>
+            <p:nvPr/>
+          </p:nvPicPr>
+          <p:blipFill>
+            <a:blip r:embed="rId34">
+              <a:alphaModFix/>
+            </a:blip>
+            <a:stretch>
+              <a:fillRect/>
+            </a:stretch>
+          </p:blipFill>
+          <p:spPr>
+            <a:xfrm>
+              <a:off x="7788908" y="481124"/>
+              <a:ext cx="504000" cy="504000"/>
+            </a:xfrm>
+            <a:prstGeom prst="rect">
+              <a:avLst/>
+            </a:prstGeom>
+            <a:noFill/>
+            <a:ln>
+              <a:noFill/>
+            </a:ln>
+          </p:spPr>
+        </p:pic>
+      </p:grpSp>
+      <p:pic>
+        <p:nvPicPr>
+          <p:cNvPr id="21" name="Immagine 20">
+            <a:extLst>
+              <a:ext uri="{FF2B5EF4-FFF2-40B4-BE49-F238E27FC236}">
+                <a16:creationId xmlns:a16="http://schemas.microsoft.com/office/drawing/2014/main" id="{DAEC7D90-3699-04C3-4200-13B0BE8AC7CA}"/>
+              </a:ext>
+            </a:extLst>
+          </p:cNvPr>
+          <p:cNvPicPr>
+            <a:picLocks noChangeAspect="1"/>
+          </p:cNvPicPr>
+          <p:nvPr/>
+        </p:nvPicPr>
+        <p:blipFill>
+          <a:blip r:embed="rId35"/>
+          <a:stretch>
+            <a:fillRect/>
+          </a:stretch>
+        </p:blipFill>
+        <p:spPr>
+          <a:xfrm>
+            <a:off x="461397" y="6150105"/>
+            <a:ext cx="774290" cy="317459"/>
+          </a:xfrm>
+          <a:prstGeom prst="rect">
+            <a:avLst/>
+          </a:prstGeom>
+        </p:spPr>
+      </p:pic>
+      <p:sp>
+        <p:nvSpPr>
+          <p:cNvPr id="27" name="Rettangolo con angoli arrotondati 26">
+            <a:extLst>
+              <a:ext uri="{FF2B5EF4-FFF2-40B4-BE49-F238E27FC236}">
+                <a16:creationId xmlns:a16="http://schemas.microsoft.com/office/drawing/2014/main" id="{13853322-2DDA-A120-1312-063E822AAAC0}"/>
+              </a:ext>
+            </a:extLst>
+          </p:cNvPr>
+          <p:cNvSpPr/>
+          <p:nvPr/>
+        </p:nvSpPr>
+        <p:spPr>
+          <a:xfrm>
+            <a:off x="291020" y="4534420"/>
+            <a:ext cx="1630699" cy="2006404"/>
+          </a:xfrm>
+          <a:prstGeom prst="roundRect">
+            <a:avLst/>
+          </a:prstGeom>
+          <a:noFill/>
+          <a:ln w="28575"/>
+        </p:spPr>
+        <p:style>
+          <a:lnRef idx="2">
+            <a:schemeClr val="accent1">
+              <a:shade val="50000"/>
+            </a:schemeClr>
+          </a:lnRef>
+          <a:fillRef idx="1">
+            <a:schemeClr val="accent1"/>
+          </a:fillRef>
+          <a:effectRef idx="0">
+            <a:schemeClr val="accent1"/>
+          </a:effectRef>
+          <a:fontRef idx="minor">
+            <a:schemeClr val="lt1"/>
+          </a:fontRef>
+        </p:style>
+        <p:txBody>
+          <a:bodyPr rtlCol="0" anchor="ctr"/>
+          <a:lstStyle/>
+          <a:p>
+            <a:pPr algn="ctr"/>
+            <a:endParaRPr lang="en-GB" sz="1463" dirty="0">
+              <a:solidFill>
+                <a:srgbClr val="FFFF00"/>
+              </a:solidFill>
+            </a:endParaRPr>
+          </a:p>
+        </p:txBody>
+      </p:sp>
+      <p:sp>
+        <p:nvSpPr>
+          <p:cNvPr id="29" name="Rettangolo con angoli arrotondati 28">
+            <a:extLst>
+              <a:ext uri="{FF2B5EF4-FFF2-40B4-BE49-F238E27FC236}">
+                <a16:creationId xmlns:a16="http://schemas.microsoft.com/office/drawing/2014/main" id="{BE30A527-5E63-45B7-9799-D4C13CD3466B}"/>
+              </a:ext>
+            </a:extLst>
+          </p:cNvPr>
+          <p:cNvSpPr/>
+          <p:nvPr/>
+        </p:nvSpPr>
+        <p:spPr>
+          <a:xfrm>
+            <a:off x="501999" y="4194259"/>
+            <a:ext cx="1184344" cy="217414"/>
+          </a:xfrm>
+          <a:prstGeom prst="roundRect">
+            <a:avLst/>
+          </a:prstGeom>
+          <a:solidFill>
+            <a:schemeClr val="accent4"/>
+          </a:solidFill>
+        </p:spPr>
+        <p:style>
+          <a:lnRef idx="2">
+            <a:schemeClr val="accent1">
+              <a:shade val="50000"/>
+            </a:schemeClr>
+          </a:lnRef>
+          <a:fillRef idx="1">
+            <a:schemeClr val="accent1"/>
+          </a:fillRef>
+          <a:effectRef idx="0">
+            <a:schemeClr val="accent1"/>
+          </a:effectRef>
+          <a:fontRef idx="minor">
+            <a:schemeClr val="lt1"/>
+          </a:fontRef>
+        </p:style>
+        <p:txBody>
+          <a:bodyPr rtlCol="0" anchor="ctr"/>
+          <a:lstStyle/>
+          <a:p>
+            <a:pPr algn="ctr"/>
+            <a:r>
+              <a:rPr lang="en-GB" sz="1463" dirty="0">
+                <a:solidFill>
+                  <a:schemeClr val="tx1"/>
+                </a:solidFill>
+              </a:rPr>
+              <a:t>AW REST API</a:t>
+            </a:r>
+          </a:p>
+        </p:txBody>
+      </p:sp>
+      <p:sp>
+        <p:nvSpPr>
+          <p:cNvPr id="46" name="Rettangolo con angoli arrotondati 45">
+            <a:extLst>
+              <a:ext uri="{FF2B5EF4-FFF2-40B4-BE49-F238E27FC236}">
+                <a16:creationId xmlns:a16="http://schemas.microsoft.com/office/drawing/2014/main" id="{6AA2C1AC-3872-5162-1345-033CB0E64203}"/>
+              </a:ext>
+            </a:extLst>
+          </p:cNvPr>
+          <p:cNvSpPr/>
+          <p:nvPr/>
+        </p:nvSpPr>
+        <p:spPr>
+          <a:xfrm>
+            <a:off x="431372" y="5191836"/>
+            <a:ext cx="1302831" cy="633737"/>
+          </a:xfrm>
+          <a:prstGeom prst="roundRect">
+            <a:avLst/>
+          </a:prstGeom>
+          <a:noFill/>
+          <a:ln>
+            <a:solidFill>
+              <a:schemeClr val="accent4"/>
+            </a:solidFill>
+          </a:ln>
+        </p:spPr>
+        <p:style>
+          <a:lnRef idx="2">
+            <a:schemeClr val="accent1">
+              <a:shade val="50000"/>
+            </a:schemeClr>
+          </a:lnRef>
+          <a:fillRef idx="1">
+            <a:schemeClr val="accent1"/>
+          </a:fillRef>
+          <a:effectRef idx="0">
+            <a:schemeClr val="accent1"/>
+          </a:effectRef>
+          <a:fontRef idx="minor">
+            <a:schemeClr val="lt1"/>
+          </a:fontRef>
+        </p:style>
+        <p:txBody>
+          <a:bodyPr rtlCol="0" anchor="t"/>
+          <a:lstStyle/>
+          <a:p>
+            <a:pPr algn="ctr"/>
+            <a:r>
+              <a:rPr lang="en-GB" sz="1463" dirty="0"/>
+              <a:t>+</a:t>
+            </a:r>
+          </a:p>
+        </p:txBody>
+      </p:sp>
+      <p:pic>
+        <p:nvPicPr>
+          <p:cNvPr id="52" name="Immagine 51">
+            <a:extLst>
+              <a:ext uri="{FF2B5EF4-FFF2-40B4-BE49-F238E27FC236}">
+                <a16:creationId xmlns:a16="http://schemas.microsoft.com/office/drawing/2014/main" id="{1D9F31A7-4B21-A258-6EFC-C8408D56D8E1}"/>
+              </a:ext>
+            </a:extLst>
+          </p:cNvPr>
+          <p:cNvPicPr>
+            <a:picLocks noChangeAspect="1"/>
+          </p:cNvPicPr>
+          <p:nvPr/>
+        </p:nvPicPr>
+        <p:blipFill>
+          <a:blip r:embed="rId36"/>
+          <a:stretch>
+            <a:fillRect/>
+          </a:stretch>
+        </p:blipFill>
+        <p:spPr>
+          <a:xfrm>
+            <a:off x="687093" y="5343271"/>
+            <a:ext cx="361187" cy="361187"/>
+          </a:xfrm>
+          <a:prstGeom prst="rect">
+            <a:avLst/>
+          </a:prstGeom>
+        </p:spPr>
+      </p:pic>
+      <p:cxnSp>
+        <p:nvCxnSpPr>
+          <p:cNvPr id="55" name="Connettore 4 54">
+            <a:extLst>
+              <a:ext uri="{FF2B5EF4-FFF2-40B4-BE49-F238E27FC236}">
+                <a16:creationId xmlns:a16="http://schemas.microsoft.com/office/drawing/2014/main" id="{7BEA7A39-8FB6-DF24-9A74-36F016FCCDD8}"/>
+              </a:ext>
+            </a:extLst>
+          </p:cNvPr>
+          <p:cNvCxnSpPr>
+            <a:cxnSpLocks/>
+            <a:stCxn id="78" idx="2"/>
+            <a:endCxn id="46" idx="2"/>
+          </p:cNvCxnSpPr>
+          <p:nvPr/>
+        </p:nvCxnSpPr>
+        <p:spPr>
+          <a:xfrm rot="5400000">
+            <a:off x="3429942" y="3060678"/>
+            <a:ext cx="417741" cy="5112048"/>
+          </a:xfrm>
+          <a:prstGeom prst="bentConnector3">
+            <a:avLst>
+              <a:gd name="adj1" fmla="val 154723"/>
+            </a:avLst>
+          </a:prstGeom>
+          <a:ln>
+            <a:solidFill>
+              <a:schemeClr val="accent4"/>
+            </a:solidFill>
+            <a:prstDash val="dash"/>
+            <a:tailEnd type="triangle"/>
+          </a:ln>
+        </p:spPr>
+        <p:style>
+          <a:lnRef idx="2">
+            <a:schemeClr val="accent1"/>
+          </a:lnRef>
+          <a:fillRef idx="0">
+            <a:schemeClr val="accent1"/>
+          </a:fillRef>
+          <a:effectRef idx="1">
+            <a:schemeClr val="accent1"/>
+          </a:effectRef>
+          <a:fontRef idx="minor">
+            <a:schemeClr val="tx1"/>
+          </a:fontRef>
+        </p:style>
+      </p:cxnSp>
+      <p:cxnSp>
+        <p:nvCxnSpPr>
+          <p:cNvPr id="56" name="Connettore 4 55">
+            <a:extLst>
+              <a:ext uri="{FF2B5EF4-FFF2-40B4-BE49-F238E27FC236}">
+                <a16:creationId xmlns:a16="http://schemas.microsoft.com/office/drawing/2014/main" id="{8DF85B5B-E29E-09EA-F291-94E0F8C5EBA6}"/>
+              </a:ext>
+            </a:extLst>
+          </p:cNvPr>
+          <p:cNvCxnSpPr>
+            <a:cxnSpLocks/>
+            <a:stCxn id="25" idx="0"/>
+            <a:endCxn id="73" idx="2"/>
+          </p:cNvCxnSpPr>
+          <p:nvPr/>
+        </p:nvCxnSpPr>
+        <p:spPr>
+          <a:xfrm rot="5400000" flipH="1" flipV="1">
+            <a:off x="6654379" y="2819472"/>
+            <a:ext cx="1066836" cy="2017379"/>
+          </a:xfrm>
+          <a:prstGeom prst="bentConnector3">
+            <a:avLst/>
+          </a:prstGeom>
+          <a:ln>
+            <a:solidFill>
+              <a:schemeClr val="accent4"/>
+            </a:solidFill>
+            <a:prstDash val="dash"/>
+            <a:tailEnd type="triangle"/>
+          </a:ln>
+        </p:spPr>
+        <p:style>
+          <a:lnRef idx="2">
+            <a:schemeClr val="accent1"/>
+          </a:lnRef>
+          <a:fillRef idx="0">
+            <a:schemeClr val="accent1"/>
+          </a:fillRef>
+          <a:effectRef idx="1">
+            <a:schemeClr val="accent1"/>
+          </a:effectRef>
+          <a:fontRef idx="minor">
+            <a:schemeClr val="tx1"/>
+          </a:fontRef>
+        </p:style>
+      </p:cxnSp>
+      <p:cxnSp>
+        <p:nvCxnSpPr>
+          <p:cNvPr id="65" name="Connettore 4 64">
+            <a:extLst>
+              <a:ext uri="{FF2B5EF4-FFF2-40B4-BE49-F238E27FC236}">
+                <a16:creationId xmlns:a16="http://schemas.microsoft.com/office/drawing/2014/main" id="{440D6767-314E-15C1-2A67-283861143AEF}"/>
+              </a:ext>
+            </a:extLst>
+          </p:cNvPr>
+          <p:cNvCxnSpPr>
+            <a:cxnSpLocks/>
+            <a:stCxn id="25" idx="0"/>
+            <a:endCxn id="10" idx="2"/>
+          </p:cNvCxnSpPr>
+          <p:nvPr/>
+        </p:nvCxnSpPr>
+        <p:spPr>
+          <a:xfrm rot="5400000" flipH="1" flipV="1">
+            <a:off x="5927232" y="3538255"/>
+            <a:ext cx="1075200" cy="571448"/>
+          </a:xfrm>
+          <a:prstGeom prst="bentConnector3">
+            <a:avLst>
+              <a:gd name="adj1" fmla="val 50000"/>
+            </a:avLst>
+          </a:prstGeom>
+          <a:ln>
+            <a:solidFill>
+              <a:schemeClr val="accent4"/>
+            </a:solidFill>
+            <a:prstDash val="dash"/>
+            <a:tailEnd type="triangle"/>
+          </a:ln>
+        </p:spPr>
+        <p:style>
+          <a:lnRef idx="2">
+            <a:schemeClr val="accent1"/>
+          </a:lnRef>
+          <a:fillRef idx="0">
+            <a:schemeClr val="accent1"/>
+          </a:fillRef>
+          <a:effectRef idx="1">
+            <a:schemeClr val="accent1"/>
+          </a:effectRef>
+          <a:fontRef idx="minor">
+            <a:schemeClr val="tx1"/>
+          </a:fontRef>
+        </p:style>
+      </p:cxnSp>
+      <p:cxnSp>
+        <p:nvCxnSpPr>
+          <p:cNvPr id="71" name="Connettore 4 70">
+            <a:extLst>
+              <a:ext uri="{FF2B5EF4-FFF2-40B4-BE49-F238E27FC236}">
+                <a16:creationId xmlns:a16="http://schemas.microsoft.com/office/drawing/2014/main" id="{9B39571D-A379-A718-F617-96C2FEF370A9}"/>
+              </a:ext>
+            </a:extLst>
+          </p:cNvPr>
+          <p:cNvCxnSpPr>
+            <a:cxnSpLocks/>
+            <a:stCxn id="25" idx="0"/>
+            <a:endCxn id="41" idx="2"/>
+          </p:cNvCxnSpPr>
+          <p:nvPr/>
+        </p:nvCxnSpPr>
+        <p:spPr>
+          <a:xfrm rot="16200000" flipV="1">
+            <a:off x="5152194" y="3334665"/>
+            <a:ext cx="1061419" cy="992410"/>
+          </a:xfrm>
+          <a:prstGeom prst="bentConnector3">
+            <a:avLst>
+              <a:gd name="adj1" fmla="val 50000"/>
+            </a:avLst>
+          </a:prstGeom>
+          <a:ln>
+            <a:solidFill>
+              <a:schemeClr val="accent4"/>
+            </a:solidFill>
+            <a:prstDash val="dash"/>
+            <a:tailEnd type="triangle"/>
+          </a:ln>
+        </p:spPr>
+        <p:style>
+          <a:lnRef idx="2">
+            <a:schemeClr val="accent1"/>
+          </a:lnRef>
+          <a:fillRef idx="0">
+            <a:schemeClr val="accent1"/>
+          </a:fillRef>
+          <a:effectRef idx="1">
+            <a:schemeClr val="accent1"/>
+          </a:effectRef>
+          <a:fontRef idx="minor">
+            <a:schemeClr val="tx1"/>
+          </a:fontRef>
+        </p:style>
+      </p:cxnSp>
+      <p:pic>
+        <p:nvPicPr>
+          <p:cNvPr id="137" name="Immagine 136">
+            <a:extLst>
+              <a:ext uri="{FF2B5EF4-FFF2-40B4-BE49-F238E27FC236}">
+                <a16:creationId xmlns:a16="http://schemas.microsoft.com/office/drawing/2014/main" id="{CF7CCBC0-4118-8C4C-5775-5B58EA2BC92C}"/>
+              </a:ext>
+            </a:extLst>
+          </p:cNvPr>
+          <p:cNvPicPr>
+            <a:picLocks noChangeAspect="1"/>
+          </p:cNvPicPr>
+          <p:nvPr/>
+        </p:nvPicPr>
+        <p:blipFill>
+          <a:blip r:embed="rId37"/>
+          <a:stretch>
+            <a:fillRect/>
+          </a:stretch>
+        </p:blipFill>
+        <p:spPr>
+          <a:xfrm>
+            <a:off x="6699864" y="4968163"/>
+            <a:ext cx="984723" cy="180533"/>
+          </a:xfrm>
+          <a:prstGeom prst="rect">
+            <a:avLst/>
+          </a:prstGeom>
+        </p:spPr>
+      </p:pic>
+      <p:pic>
+        <p:nvPicPr>
+          <p:cNvPr id="138" name="Immagine 137">
+            <a:extLst>
+              <a:ext uri="{FF2B5EF4-FFF2-40B4-BE49-F238E27FC236}">
+                <a16:creationId xmlns:a16="http://schemas.microsoft.com/office/drawing/2014/main" id="{E7A22DDA-4829-3287-4A6E-DFEC92BE8664}"/>
+              </a:ext>
+            </a:extLst>
+          </p:cNvPr>
+          <p:cNvPicPr>
+            <a:picLocks noChangeAspect="1"/>
+          </p:cNvPicPr>
+          <p:nvPr/>
+        </p:nvPicPr>
+        <p:blipFill>
+          <a:blip r:embed="rId38"/>
+          <a:stretch>
+            <a:fillRect/>
+          </a:stretch>
+        </p:blipFill>
+        <p:spPr>
+          <a:xfrm>
+            <a:off x="6699864" y="4482830"/>
+            <a:ext cx="984723" cy="180533"/>
+          </a:xfrm>
+          <a:prstGeom prst="rect">
+            <a:avLst/>
+          </a:prstGeom>
+        </p:spPr>
+      </p:pic>
+      <p:pic>
+        <p:nvPicPr>
+          <p:cNvPr id="139" name="Immagine 138">
+            <a:extLst>
+              <a:ext uri="{FF2B5EF4-FFF2-40B4-BE49-F238E27FC236}">
+                <a16:creationId xmlns:a16="http://schemas.microsoft.com/office/drawing/2014/main" id="{0BBC07E3-FBC3-4752-0CAB-CC5C8125AA1D}"/>
+              </a:ext>
+            </a:extLst>
+          </p:cNvPr>
+          <p:cNvPicPr>
+            <a:picLocks noChangeAspect="1"/>
+          </p:cNvPicPr>
+          <p:nvPr/>
+        </p:nvPicPr>
+        <p:blipFill>
+          <a:blip r:embed="rId39"/>
+          <a:stretch>
+            <a:fillRect/>
+          </a:stretch>
+        </p:blipFill>
+        <p:spPr>
+          <a:xfrm>
+            <a:off x="6699862" y="4711430"/>
+            <a:ext cx="984725" cy="180533"/>
+          </a:xfrm>
+          <a:prstGeom prst="rect">
+            <a:avLst/>
+          </a:prstGeom>
+        </p:spPr>
+      </p:pic>
+      <p:cxnSp>
+        <p:nvCxnSpPr>
+          <p:cNvPr id="142" name="Connettore 4 141">
+            <a:extLst>
+              <a:ext uri="{FF2B5EF4-FFF2-40B4-BE49-F238E27FC236}">
+                <a16:creationId xmlns:a16="http://schemas.microsoft.com/office/drawing/2014/main" id="{8C02A4E8-461B-807F-671A-02C797C66000}"/>
+              </a:ext>
+            </a:extLst>
+          </p:cNvPr>
+          <p:cNvCxnSpPr>
+            <a:stCxn id="64" idx="3"/>
+            <a:endCxn id="25" idx="1"/>
+          </p:cNvCxnSpPr>
+          <p:nvPr/>
+        </p:nvCxnSpPr>
+        <p:spPr>
+          <a:xfrm>
+            <a:off x="1712875" y="4874793"/>
+            <a:ext cx="2813070" cy="11097"/>
+          </a:xfrm>
+          <a:prstGeom prst="bentConnector3">
+            <a:avLst/>
+          </a:prstGeom>
+          <a:ln w="28575">
+            <a:solidFill>
+              <a:schemeClr val="accent4"/>
+            </a:solidFill>
+            <a:tailEnd type="triangle"/>
+          </a:ln>
+        </p:spPr>
+        <p:style>
+          <a:lnRef idx="2">
+            <a:schemeClr val="accent1"/>
+          </a:lnRef>
+          <a:fillRef idx="0">
+            <a:schemeClr val="accent1"/>
+          </a:fillRef>
+          <a:effectRef idx="1">
+            <a:schemeClr val="accent1"/>
+          </a:effectRef>
+          <a:fontRef idx="minor">
+            <a:schemeClr val="tx1"/>
+          </a:fontRef>
+        </p:style>
+      </p:cxnSp>
+      <p:cxnSp>
+        <p:nvCxnSpPr>
+          <p:cNvPr id="143" name="Connettore 2 142">
+            <a:extLst>
+              <a:ext uri="{FF2B5EF4-FFF2-40B4-BE49-F238E27FC236}">
+                <a16:creationId xmlns:a16="http://schemas.microsoft.com/office/drawing/2014/main" id="{01807D7E-48AD-4526-9D6F-7A4F488BA4D6}"/>
+              </a:ext>
+            </a:extLst>
+          </p:cNvPr>
+          <p:cNvCxnSpPr>
+            <a:cxnSpLocks/>
+          </p:cNvCxnSpPr>
+          <p:nvPr/>
+        </p:nvCxnSpPr>
+        <p:spPr>
+          <a:xfrm>
+            <a:off x="7905230" y="4699577"/>
+            <a:ext cx="299170" cy="0"/>
+          </a:xfrm>
+          <a:prstGeom prst="straightConnector1">
+            <a:avLst/>
+          </a:prstGeom>
+          <a:ln w="28575">
+            <a:solidFill>
+              <a:srgbClr val="00B0F0"/>
+            </a:solidFill>
+            <a:prstDash val="dash"/>
+            <a:tailEnd type="triangle"/>
+          </a:ln>
+        </p:spPr>
+        <p:style>
+          <a:lnRef idx="1">
+            <a:schemeClr val="accent1"/>
+          </a:lnRef>
+          <a:fillRef idx="0">
+            <a:schemeClr val="accent1"/>
+          </a:fillRef>
+          <a:effectRef idx="0">
+            <a:schemeClr val="accent1"/>
+          </a:effectRef>
+          <a:fontRef idx="minor">
+            <a:schemeClr val="tx1"/>
+          </a:fontRef>
+        </p:style>
+      </p:cxnSp>
+      <p:cxnSp>
+        <p:nvCxnSpPr>
+          <p:cNvPr id="146" name="Connettore 2 145">
+            <a:extLst>
+              <a:ext uri="{FF2B5EF4-FFF2-40B4-BE49-F238E27FC236}">
+                <a16:creationId xmlns:a16="http://schemas.microsoft.com/office/drawing/2014/main" id="{83D0F510-2846-F644-5F23-A6A0149285EF}"/>
+              </a:ext>
+            </a:extLst>
+          </p:cNvPr>
+          <p:cNvCxnSpPr>
+            <a:cxnSpLocks/>
+          </p:cNvCxnSpPr>
+          <p:nvPr/>
+        </p:nvCxnSpPr>
+        <p:spPr>
+          <a:xfrm>
+            <a:off x="7879954" y="5202850"/>
+            <a:ext cx="324446" cy="0"/>
+          </a:xfrm>
+          <a:prstGeom prst="straightConnector1">
+            <a:avLst/>
+          </a:prstGeom>
+          <a:ln w="28575">
+            <a:solidFill>
+              <a:srgbClr val="00B0F0"/>
+            </a:solidFill>
+            <a:prstDash val="dash"/>
+            <a:tailEnd type="triangle"/>
+          </a:ln>
+        </p:spPr>
+        <p:style>
+          <a:lnRef idx="1">
+            <a:schemeClr val="accent1"/>
+          </a:lnRef>
+          <a:fillRef idx="0">
+            <a:schemeClr val="accent1"/>
+          </a:fillRef>
+          <a:effectRef idx="0">
+            <a:schemeClr val="accent1"/>
+          </a:effectRef>
+          <a:fontRef idx="minor">
+            <a:schemeClr val="tx1"/>
+          </a:fontRef>
+        </p:style>
+      </p:cxnSp>
+      <p:sp>
+        <p:nvSpPr>
+          <p:cNvPr id="153" name="CasellaDiTesto 152">
+            <a:extLst>
+              <a:ext uri="{FF2B5EF4-FFF2-40B4-BE49-F238E27FC236}">
+                <a16:creationId xmlns:a16="http://schemas.microsoft.com/office/drawing/2014/main" id="{92A5B1AD-F713-5939-A7A0-5399646AF093}"/>
+              </a:ext>
+            </a:extLst>
+          </p:cNvPr>
+          <p:cNvSpPr txBox="1"/>
+          <p:nvPr/>
+        </p:nvSpPr>
+        <p:spPr>
+          <a:xfrm>
+            <a:off x="980318" y="5355826"/>
+            <a:ext cx="617477" cy="307777"/>
+          </a:xfrm>
+          <a:prstGeom prst="rect">
+            <a:avLst/>
+          </a:prstGeom>
+          <a:noFill/>
+        </p:spPr>
+        <p:txBody>
+          <a:bodyPr wrap="none" rtlCol="0">
+            <a:spAutoFit/>
+          </a:bodyPr>
+          <a:lstStyle/>
+          <a:p>
+            <a:r>
+              <a:rPr lang="en-GB" sz="1400" b="1" dirty="0">
+                <a:solidFill>
+                  <a:srgbClr val="7030A0"/>
+                </a:solidFill>
+                <a:latin typeface="Montserrat" pitchFamily="2" charset="77"/>
+              </a:rPr>
+              <a:t>POD</a:t>
+            </a:r>
+          </a:p>
+        </p:txBody>
+      </p:sp>
+      <p:pic>
+        <p:nvPicPr>
+          <p:cNvPr id="9" name="Immagine 8">
+            <a:extLst>
+              <a:ext uri="{FF2B5EF4-FFF2-40B4-BE49-F238E27FC236}">
+                <a16:creationId xmlns:a16="http://schemas.microsoft.com/office/drawing/2014/main" id="{E9E8A06E-CB54-2FBE-C589-08750F421FC3}"/>
+              </a:ext>
+            </a:extLst>
+          </p:cNvPr>
+          <p:cNvPicPr>
+            <a:picLocks noChangeAspect="1"/>
+          </p:cNvPicPr>
+          <p:nvPr/>
+        </p:nvPicPr>
+        <p:blipFill>
+          <a:blip r:embed="rId40"/>
+          <a:stretch>
+            <a:fillRect/>
+          </a:stretch>
+        </p:blipFill>
+        <p:spPr>
+          <a:xfrm>
+            <a:off x="4696998" y="4845480"/>
+            <a:ext cx="581890" cy="400959"/>
+          </a:xfrm>
+          <a:prstGeom prst="rect">
+            <a:avLst/>
+          </a:prstGeom>
+        </p:spPr>
+      </p:pic>
+      <p:pic>
+        <p:nvPicPr>
+          <p:cNvPr id="38" name="Immagine 37">
+            <a:extLst>
+              <a:ext uri="{FF2B5EF4-FFF2-40B4-BE49-F238E27FC236}">
+                <a16:creationId xmlns:a16="http://schemas.microsoft.com/office/drawing/2014/main" id="{B1E89783-E564-EA03-8307-A04E358823C2}"/>
+              </a:ext>
+            </a:extLst>
+          </p:cNvPr>
+          <p:cNvPicPr>
+            <a:picLocks noChangeAspect="1"/>
+          </p:cNvPicPr>
+          <p:nvPr/>
+        </p:nvPicPr>
+        <p:blipFill>
+          <a:blip r:embed="rId27"/>
+          <a:stretch>
+            <a:fillRect/>
+          </a:stretch>
+        </p:blipFill>
+        <p:spPr>
+          <a:xfrm>
+            <a:off x="2295676" y="4648200"/>
+            <a:ext cx="546768" cy="546768"/>
+          </a:xfrm>
+          <a:prstGeom prst="rect">
+            <a:avLst/>
+          </a:prstGeom>
+        </p:spPr>
+      </p:pic>
+      <p:pic>
+        <p:nvPicPr>
+          <p:cNvPr id="45" name="Elemento grafico 44" descr="Rete contorno">
+            <a:extLst>
+              <a:ext uri="{FF2B5EF4-FFF2-40B4-BE49-F238E27FC236}">
+                <a16:creationId xmlns:a16="http://schemas.microsoft.com/office/drawing/2014/main" id="{8EAEE893-D195-D0BB-C6DD-69C37A5654E5}"/>
+              </a:ext>
+            </a:extLst>
+          </p:cNvPr>
+          <p:cNvPicPr>
+            <a:picLocks noChangeAspect="1"/>
+          </p:cNvPicPr>
+          <p:nvPr/>
+        </p:nvPicPr>
+        <p:blipFill>
+          <a:blip r:embed="rId41">
+            <a:extLst>
+              <a:ext uri="{28A0092B-C50C-407E-A947-70E740481C1C}">
+                <a14:useLocalDpi xmlns:a14="http://schemas.microsoft.com/office/drawing/2010/main" val="0"/>
+              </a:ext>
+              <a:ext uri="{96DAC541-7B7A-43D3-8B79-37D633B846F1}">
+                <asvg:svgBlip xmlns:asvg="http://schemas.microsoft.com/office/drawing/2016/SVG/main" r:embed="rId42"/>
+              </a:ext>
+            </a:extLst>
+          </a:blip>
+          <a:stretch>
+            <a:fillRect/>
+          </a:stretch>
+        </p:blipFill>
+        <p:spPr>
+          <a:xfrm>
+            <a:off x="5630587" y="4303093"/>
+            <a:ext cx="984725" cy="984725"/>
+          </a:xfrm>
+          <a:prstGeom prst="rect">
+            <a:avLst/>
+          </a:prstGeom>
+        </p:spPr>
+      </p:pic>
+      <p:sp>
+        <p:nvSpPr>
+          <p:cNvPr id="78" name="CasellaDiTesto 77">
+            <a:extLst>
+              <a:ext uri="{FF2B5EF4-FFF2-40B4-BE49-F238E27FC236}">
+                <a16:creationId xmlns:a16="http://schemas.microsoft.com/office/drawing/2014/main" id="{F0B8D51D-AA35-B5A5-17E9-C8486CE05DE0}"/>
+              </a:ext>
+            </a:extLst>
+          </p:cNvPr>
+          <p:cNvSpPr txBox="1"/>
+          <p:nvPr/>
+        </p:nvSpPr>
+        <p:spPr>
+          <a:xfrm>
+            <a:off x="5381151" y="5130833"/>
+            <a:ext cx="1627369" cy="276999"/>
+          </a:xfrm>
+          <a:prstGeom prst="rect">
+            <a:avLst/>
+          </a:prstGeom>
+          <a:noFill/>
+        </p:spPr>
+        <p:txBody>
+          <a:bodyPr wrap="none" rtlCol="0">
+            <a:spAutoFit/>
+          </a:bodyPr>
+          <a:lstStyle/>
+          <a:p>
+            <a:r>
+              <a:rPr lang="en-GB" sz="1200" b="1" dirty="0">
+                <a:latin typeface="Montserrat" pitchFamily="2" charset="77"/>
+              </a:rPr>
+              <a:t>Knowledge graph</a:t>
+            </a:r>
+          </a:p>
+        </p:txBody>
+      </p:sp>
+      <p:pic>
+        <p:nvPicPr>
+          <p:cNvPr id="103" name="Elemento grafico 102" descr="Collegamento contorno">
+            <a:extLst>
+              <a:ext uri="{FF2B5EF4-FFF2-40B4-BE49-F238E27FC236}">
+                <a16:creationId xmlns:a16="http://schemas.microsoft.com/office/drawing/2014/main" id="{2427B76D-D47E-60C9-EF62-CAC8670F9632}"/>
+              </a:ext>
+            </a:extLst>
+          </p:cNvPr>
+          <p:cNvPicPr>
+            <a:picLocks noChangeAspect="1"/>
+          </p:cNvPicPr>
+          <p:nvPr/>
+        </p:nvPicPr>
+        <p:blipFill>
+          <a:blip r:embed="rId43">
+            <a:extLst>
+              <a:ext uri="{28A0092B-C50C-407E-A947-70E740481C1C}">
+                <a14:useLocalDpi xmlns:a14="http://schemas.microsoft.com/office/drawing/2010/main" val="0"/>
+              </a:ext>
+              <a:ext uri="{96DAC541-7B7A-43D3-8B79-37D633B846F1}">
+                <asvg:svgBlip xmlns:asvg="http://schemas.microsoft.com/office/drawing/2016/SVG/main" r:embed="rId44"/>
+              </a:ext>
+            </a:extLst>
+          </a:blip>
+          <a:stretch>
+            <a:fillRect/>
+          </a:stretch>
+        </p:blipFill>
+        <p:spPr>
+          <a:xfrm>
+            <a:off x="7611388" y="2557538"/>
+            <a:ext cx="711583" cy="711583"/>
+          </a:xfrm>
+          <a:prstGeom prst="rect">
+            <a:avLst/>
+          </a:prstGeom>
+        </p:spPr>
+      </p:pic>
+      <p:pic>
+        <p:nvPicPr>
+          <p:cNvPr id="106" name="Elemento grafico 105" descr="Grafico a barre con andamento ascendente con riempimento a tinta unita">
+            <a:extLst>
+              <a:ext uri="{FF2B5EF4-FFF2-40B4-BE49-F238E27FC236}">
+                <a16:creationId xmlns:a16="http://schemas.microsoft.com/office/drawing/2014/main" id="{8D70800A-DF6E-4A7B-F5F4-0497491F86BF}"/>
+              </a:ext>
+            </a:extLst>
+          </p:cNvPr>
+          <p:cNvPicPr>
+            <a:picLocks noChangeAspect="1"/>
+          </p:cNvPicPr>
+          <p:nvPr/>
+        </p:nvPicPr>
+        <p:blipFill>
+          <a:blip r:embed="rId45">
+            <a:extLst>
+              <a:ext uri="{28A0092B-C50C-407E-A947-70E740481C1C}">
+                <a14:useLocalDpi xmlns:a14="http://schemas.microsoft.com/office/drawing/2010/main" val="0"/>
+              </a:ext>
+              <a:ext uri="{96DAC541-7B7A-43D3-8B79-37D633B846F1}">
+                <asvg:svgBlip xmlns:asvg="http://schemas.microsoft.com/office/drawing/2016/SVG/main" r:embed="rId46"/>
+              </a:ext>
+            </a:extLst>
+          </a:blip>
+          <a:stretch>
+            <a:fillRect/>
+          </a:stretch>
+        </p:blipFill>
+        <p:spPr>
+          <a:xfrm>
+            <a:off x="6455126" y="2649455"/>
+            <a:ext cx="576120" cy="576120"/>
+          </a:xfrm>
+          <a:prstGeom prst="rect">
+            <a:avLst/>
+          </a:prstGeom>
+        </p:spPr>
+      </p:pic>
+      <p:pic>
+        <p:nvPicPr>
+          <p:cNvPr id="134" name="Immagine 133">
+            <a:extLst>
+              <a:ext uri="{FF2B5EF4-FFF2-40B4-BE49-F238E27FC236}">
+                <a16:creationId xmlns:a16="http://schemas.microsoft.com/office/drawing/2014/main" id="{AD839EEB-C8BE-5576-F865-1056079D678A}"/>
+              </a:ext>
+            </a:extLst>
+          </p:cNvPr>
+          <p:cNvPicPr>
+            <a:picLocks noChangeAspect="1"/>
+          </p:cNvPicPr>
+          <p:nvPr/>
+        </p:nvPicPr>
+        <p:blipFill>
+          <a:blip r:embed="rId47"/>
+          <a:stretch>
+            <a:fillRect/>
+          </a:stretch>
+        </p:blipFill>
+        <p:spPr>
+          <a:xfrm>
+            <a:off x="3363483" y="6297220"/>
+            <a:ext cx="476299" cy="316399"/>
+          </a:xfrm>
+          <a:prstGeom prst="rect">
+            <a:avLst/>
+          </a:prstGeom>
+        </p:spPr>
+      </p:pic>
+      <p:sp>
+        <p:nvSpPr>
+          <p:cNvPr id="136" name="CasellaDiTesto 135">
+            <a:extLst>
+              <a:ext uri="{FF2B5EF4-FFF2-40B4-BE49-F238E27FC236}">
+                <a16:creationId xmlns:a16="http://schemas.microsoft.com/office/drawing/2014/main" id="{F4E46677-9E89-A00B-99A0-7B4194D321CD}"/>
+              </a:ext>
+            </a:extLst>
+          </p:cNvPr>
+          <p:cNvSpPr txBox="1"/>
+          <p:nvPr/>
+        </p:nvSpPr>
+        <p:spPr>
+          <a:xfrm>
+            <a:off x="3809390" y="6306853"/>
+            <a:ext cx="1741182" cy="307777"/>
+          </a:xfrm>
+          <a:prstGeom prst="rect">
+            <a:avLst/>
+          </a:prstGeom>
+          <a:noFill/>
+        </p:spPr>
+        <p:txBody>
+          <a:bodyPr wrap="none" rtlCol="0">
+            <a:spAutoFit/>
+          </a:bodyPr>
+          <a:lstStyle/>
+          <a:p>
+            <a:r>
+              <a:rPr lang="en-GB" sz="1400" b="1" dirty="0">
+                <a:latin typeface="Montserrat" pitchFamily="2" charset="77"/>
+              </a:rPr>
+              <a:t>GDPR compliant</a:t>
+            </a:r>
+          </a:p>
+        </p:txBody>
+      </p:sp>
+      <p:pic>
+        <p:nvPicPr>
+          <p:cNvPr id="6" name="Immagine 5">
+            <a:extLst>
+              <a:ext uri="{FF2B5EF4-FFF2-40B4-BE49-F238E27FC236}">
+                <a16:creationId xmlns:a16="http://schemas.microsoft.com/office/drawing/2014/main" id="{E100B1AC-C171-19DA-AE9B-1E256CA49F2D}"/>
+              </a:ext>
+            </a:extLst>
+          </p:cNvPr>
+          <p:cNvPicPr>
+            <a:picLocks noChangeAspect="1"/>
+          </p:cNvPicPr>
+          <p:nvPr/>
+        </p:nvPicPr>
+        <p:blipFill>
+          <a:blip r:embed="rId48"/>
+          <a:stretch>
+            <a:fillRect/>
+          </a:stretch>
+        </p:blipFill>
+        <p:spPr>
+          <a:xfrm>
+            <a:off x="8144610" y="68290"/>
+            <a:ext cx="1882279" cy="591035"/>
+          </a:xfrm>
+          <a:prstGeom prst="rect">
+            <a:avLst/>
+          </a:prstGeom>
+        </p:spPr>
+      </p:pic>
+    </p:spTree>
+    <p:extLst>
+      <p:ext uri="{BB962C8B-B14F-4D97-AF65-F5344CB8AC3E}">
+        <p14:creationId xmlns:p14="http://schemas.microsoft.com/office/powerpoint/2010/main" val="2787881085"/>
       </p:ext>
     </p:extLst>
   </p:cSld>
@@ -26869,7 +29952,7 @@
         <a:effectLst/>
         <a:extLst>
           <a:ext uri="{AF507438-7753-43e0-B8FC-AC1667EBCBE1}">
-            <a14:hiddenEffects xmlns:a14="http://schemas.microsoft.com/office/drawing/2010/main" xmlns="">
+            <a14:hiddenEffects xmlns="" xmlns:a14="http://schemas.microsoft.com/office/drawing/2010/main">
               <a:effectLst>
                 <a:outerShdw blurRad="63500" dist="38099" dir="2700000" algn="ctr" rotWithShape="0">
                   <a:schemeClr val="bg2">
@@ -26945,7 +30028,7 @@
         <a:effectLst/>
         <a:extLst>
           <a:ext uri="{AF507438-7753-43e0-B8FC-AC1667EBCBE1}">
-            <a14:hiddenEffects xmlns:a14="http://schemas.microsoft.com/office/drawing/2010/main" xmlns="">
+            <a14:hiddenEffects xmlns="" xmlns:a14="http://schemas.microsoft.com/office/drawing/2010/main">
               <a:effectLst>
                 <a:outerShdw blurRad="63500" dist="38099" dir="2700000" algn="ctr" rotWithShape="0">
                   <a:schemeClr val="bg2">
@@ -27736,7 +30819,7 @@
         <a:effectLst/>
         <a:extLst>
           <a:ext uri="{AF507438-7753-43e0-B8FC-AC1667EBCBE1}">
-            <a14:hiddenEffects xmlns:a14="http://schemas.microsoft.com/office/drawing/2010/main" xmlns="">
+            <a14:hiddenEffects xmlns="" xmlns:a14="http://schemas.microsoft.com/office/drawing/2010/main">
               <a:effectLst>
                 <a:outerShdw blurRad="63500" dist="38099" dir="2700000" algn="ctr" rotWithShape="0">
                   <a:schemeClr val="bg2">
@@ -27812,7 +30895,7 @@
         <a:effectLst/>
         <a:extLst>
           <a:ext uri="{AF507438-7753-43e0-B8FC-AC1667EBCBE1}">
-            <a14:hiddenEffects xmlns:a14="http://schemas.microsoft.com/office/drawing/2010/main" xmlns="">
+            <a14:hiddenEffects xmlns="" xmlns:a14="http://schemas.microsoft.com/office/drawing/2010/main">
               <a:effectLst>
                 <a:outerShdw blurRad="63500" dist="38099" dir="2700000" algn="ctr" rotWithShape="0">
                   <a:schemeClr val="bg2">
@@ -29630,140 +32713,12 @@
 </file>
 
 <file path=customXml/item1.xml><?xml version="1.0" encoding="utf-8"?>
-<p:properties xmlns:p="http://schemas.microsoft.com/office/2006/metadata/properties" xmlns:xsi="http://www.w3.org/2001/XMLSchema-instance" xmlns:pc="http://schemas.microsoft.com/office/infopath/2007/PartnerControls">
-  <documentManagement>
-    <DirectSourceMarket xmlns="7851d254-ce09-43b6-8d90-072588e7901c">english</DirectSourceMarket>
-    <ApprovalStatus xmlns="7851d254-ce09-43b6-8d90-072588e7901c">InProgress</ApprovalStatus>
-    <MarketSpecific xmlns="7851d254-ce09-43b6-8d90-072588e7901c">false</MarketSpecific>
-    <PrimaryImageGen xmlns="7851d254-ce09-43b6-8d90-072588e7901c">true</PrimaryImageGen>
-    <ThumbnailAssetId xmlns="7851d254-ce09-43b6-8d90-072588e7901c" xsi:nil="true"/>
-    <LegacyData xmlns="7851d254-ce09-43b6-8d90-072588e7901c">ListingID:;Manager:;BuildStatus:Preview Pending;MockupPath:</LegacyData>
-    <TPFriendlyName xmlns="7851d254-ce09-43b6-8d90-072588e7901c">Marketing plan</TPFriendlyName>
-    <NumericId xmlns="7851d254-ce09-43b6-8d90-072588e7901c">-1</NumericId>
-    <BusinessGroup xmlns="7851d254-ce09-43b6-8d90-072588e7901c" xsi:nil="true"/>
-    <SourceTitle xmlns="7851d254-ce09-43b6-8d90-072588e7901c">Marketing plan</SourceTitle>
-    <APEditor xmlns="7851d254-ce09-43b6-8d90-072588e7901c">
-      <UserInfo>
-        <DisplayName>REDMOND\v-luannv</DisplayName>
-        <AccountId>237</AccountId>
-        <AccountType/>
-      </UserInfo>
-    </APEditor>
-    <OpenTemplate xmlns="7851d254-ce09-43b6-8d90-072588e7901c">true</OpenTemplate>
-    <UALocComments xmlns="7851d254-ce09-43b6-8d90-072588e7901c" xsi:nil="true"/>
-    <ParentAssetId xmlns="7851d254-ce09-43b6-8d90-072588e7901c" xsi:nil="true"/>
-    <PublishStatusLookup xmlns="7851d254-ce09-43b6-8d90-072588e7901c">
-      <Value>256759</Value>
-      <Value>353365</Value>
-    </PublishStatusLookup>
-    <LastPublishResultLookup xmlns="7851d254-ce09-43b6-8d90-072588e7901c" xsi:nil="true"/>
-    <IntlLangReviewDate xmlns="7851d254-ce09-43b6-8d90-072588e7901c">2010-04-16T13:14:00+00:00</IntlLangReviewDate>
-    <MachineTranslated xmlns="7851d254-ce09-43b6-8d90-072588e7901c">false</MachineTranslated>
-    <Providers xmlns="7851d254-ce09-43b6-8d90-072588e7901c" xsi:nil="true"/>
-    <OriginalSourceMarket xmlns="7851d254-ce09-43b6-8d90-072588e7901c">english</OriginalSourceMarket>
-    <TPInstallLocation xmlns="7851d254-ce09-43b6-8d90-072588e7901c">{My Templates}</TPInstallLocation>
-    <ClipArtFilename xmlns="7851d254-ce09-43b6-8d90-072588e7901c" xsi:nil="true"/>
-    <APDescription xmlns="7851d254-ce09-43b6-8d90-072588e7901c" xsi:nil="true"/>
-    <ContentItem xmlns="7851d254-ce09-43b6-8d90-072588e7901c" xsi:nil="true"/>
-    <APAuthor xmlns="7851d254-ce09-43b6-8d90-072588e7901c">
-      <UserInfo>
-        <DisplayName>REDMOND\cynvey</DisplayName>
-        <AccountId>242</AccountId>
-        <AccountType/>
-      </UserInfo>
-    </APAuthor>
-    <TPCommandLine xmlns="7851d254-ce09-43b6-8d90-072588e7901c">{PP} /n {FilePath}</TPCommandLine>
-    <TPAppVersion xmlns="7851d254-ce09-43b6-8d90-072588e7901c">11</TPAppVersion>
-    <PublishTargets xmlns="7851d254-ce09-43b6-8d90-072588e7901c">OfficeOnline</PublishTargets>
-    <EditorialStatus xmlns="7851d254-ce09-43b6-8d90-072588e7901c" xsi:nil="true"/>
-    <TPLaunchHelpLinkType xmlns="7851d254-ce09-43b6-8d90-072588e7901c" xsi:nil="true"/>
-    <LastModifiedDateTime xmlns="7851d254-ce09-43b6-8d90-072588e7901c">2010-04-16T13:14:00+00:00</LastModifiedDateTime>
-    <TimesCloned xmlns="7851d254-ce09-43b6-8d90-072588e7901c" xsi:nil="true"/>
-    <Provider xmlns="7851d254-ce09-43b6-8d90-072588e7901c">EY010390810</Provider>
-    <FriendlyTitle xmlns="7851d254-ce09-43b6-8d90-072588e7901c" xsi:nil="true"/>
-    <LastHandOff xmlns="7851d254-ce09-43b6-8d90-072588e7901c" xsi:nil="true"/>
-    <AcquiredFrom xmlns="7851d254-ce09-43b6-8d90-072588e7901c">Community</AcquiredFrom>
-    <AssetStart xmlns="7851d254-ce09-43b6-8d90-072588e7901c">2010-02-26T13:23:18+00:00</AssetStart>
-    <UACurrentWords xmlns="7851d254-ce09-43b6-8d90-072588e7901c">0</UACurrentWords>
-    <UALocRecommendation xmlns="7851d254-ce09-43b6-8d90-072588e7901c">Localize</UALocRecommendation>
-    <Manager xmlns="7851d254-ce09-43b6-8d90-072588e7901c" xsi:nil="true"/>
-    <TPClientViewer xmlns="7851d254-ce09-43b6-8d90-072588e7901c" xsi:nil="true"/>
-    <ArtSampleDocs xmlns="7851d254-ce09-43b6-8d90-072588e7901c" xsi:nil="true"/>
-    <IsDeleted xmlns="7851d254-ce09-43b6-8d90-072588e7901c">false</IsDeleted>
-    <UANotes xmlns="7851d254-ce09-43b6-8d90-072588e7901c">online only</UANotes>
-    <ShowIn xmlns="7851d254-ce09-43b6-8d90-072588e7901c">Show everywhere</ShowIn>
-    <OOCacheId xmlns="7851d254-ce09-43b6-8d90-072588e7901c" xsi:nil="true"/>
-    <CSXHash xmlns="7851d254-ce09-43b6-8d90-072588e7901c" xsi:nil="true"/>
-    <TemplateStatus xmlns="7851d254-ce09-43b6-8d90-072588e7901c" xsi:nil="true"/>
-    <Downloads xmlns="7851d254-ce09-43b6-8d90-072588e7901c">0</Downloads>
-    <VoteCount xmlns="7851d254-ce09-43b6-8d90-072588e7901c" xsi:nil="true"/>
-    <DSATActionTaken xmlns="7851d254-ce09-43b6-8d90-072588e7901c">Best Bets</DSATActionTaken>
-    <CSXSubmissionMarket xmlns="7851d254-ce09-43b6-8d90-072588e7901c" xsi:nil="true"/>
-    <AssetExpire xmlns="7851d254-ce09-43b6-8d90-072588e7901c">2100-01-01T00:00:00+00:00</AssetExpire>
-    <EditorialTags xmlns="7851d254-ce09-43b6-8d90-072588e7901c" xsi:nil="true"/>
-    <SubmitterId xmlns="7851d254-ce09-43b6-8d90-072588e7901c" xsi:nil="true"/>
-    <TPExecutable xmlns="7851d254-ce09-43b6-8d90-072588e7901c" xsi:nil="true"/>
-    <AssetType xmlns="7851d254-ce09-43b6-8d90-072588e7901c">TP</AssetType>
-    <ApprovalLog xmlns="7851d254-ce09-43b6-8d90-072588e7901c" xsi:nil="true"/>
-    <CSXUpdate xmlns="7851d254-ce09-43b6-8d90-072588e7901c">false</CSXUpdate>
-    <CSXSubmissionDate xmlns="7851d254-ce09-43b6-8d90-072588e7901c" xsi:nil="true"/>
-    <BugNumber xmlns="7851d254-ce09-43b6-8d90-072588e7901c" xsi:nil="true"/>
-    <TPComponent xmlns="7851d254-ce09-43b6-8d90-072588e7901c">PPTFiles</TPComponent>
-    <Milestone xmlns="7851d254-ce09-43b6-8d90-072588e7901c" xsi:nil="true"/>
-    <OriginAsset xmlns="7851d254-ce09-43b6-8d90-072588e7901c" xsi:nil="true"/>
-    <AssetId xmlns="7851d254-ce09-43b6-8d90-072588e7901c">TP010107969</AssetId>
-    <TPLaunchHelpLink xmlns="7851d254-ce09-43b6-8d90-072588e7901c" xsi:nil="true"/>
-    <TPApplication xmlns="7851d254-ce09-43b6-8d90-072588e7901c">PowerPoint</TPApplication>
-    <IntlLocPriority xmlns="7851d254-ce09-43b6-8d90-072588e7901c" xsi:nil="true"/>
-    <PolicheckWords xmlns="7851d254-ce09-43b6-8d90-072588e7901c" xsi:nil="true"/>
-    <HandoffToMSDN xmlns="7851d254-ce09-43b6-8d90-072588e7901c">2010-04-16T13:14:00+00:00</HandoffToMSDN>
-    <PlannedPubDate xmlns="7851d254-ce09-43b6-8d90-072588e7901c">2010-04-16T13:14:00+00:00</PlannedPubDate>
-    <IntlLangReviewer xmlns="7851d254-ce09-43b6-8d90-072588e7901c" xsi:nil="true"/>
-    <CrawlForDependencies xmlns="7851d254-ce09-43b6-8d90-072588e7901c">false</CrawlForDependencies>
-    <TrustLevel xmlns="7851d254-ce09-43b6-8d90-072588e7901c">1 Microsoft Managed Content</TrustLevel>
-    <IsSearchable xmlns="7851d254-ce09-43b6-8d90-072588e7901c">false</IsSearchable>
-    <TPNamespace xmlns="7851d254-ce09-43b6-8d90-072588e7901c" xsi:nil="true"/>
-    <TemplateTemplateType xmlns="7851d254-ce09-43b6-8d90-072588e7901c">PowerPoint 12 Default</TemplateTemplateType>
-    <Markets xmlns="7851d254-ce09-43b6-8d90-072588e7901c"/>
-    <OutputCachingOn xmlns="7851d254-ce09-43b6-8d90-072588e7901c">false</OutputCachingOn>
-    <IntlLangReview xmlns="7851d254-ce09-43b6-8d90-072588e7901c" xsi:nil="true"/>
-    <UAProjectedTotalWords xmlns="7851d254-ce09-43b6-8d90-072588e7901c" xsi:nil="true"/>
-    <CampaignTagsTaxHTField0 xmlns="7851d254-ce09-43b6-8d90-072588e7901c">
-      <Terms xmlns="http://schemas.microsoft.com/office/infopath/2007/PartnerControls"/>
-    </CampaignTagsTaxHTField0>
-    <LocPublishedDependentAssetsLookup xmlns="7851d254-ce09-43b6-8d90-072588e7901c" xsi:nil="true"/>
-    <LocOverallLocStatusLookup xmlns="7851d254-ce09-43b6-8d90-072588e7901c" xsi:nil="true"/>
-    <InternalTagsTaxHTField0 xmlns="7851d254-ce09-43b6-8d90-072588e7901c">
-      <Terms xmlns="http://schemas.microsoft.com/office/infopath/2007/PartnerControls"/>
-    </InternalTagsTaxHTField0>
-    <LocComments xmlns="7851d254-ce09-43b6-8d90-072588e7901c" xsi:nil="true"/>
-    <LocProcessedForMarketsLookup xmlns="7851d254-ce09-43b6-8d90-072588e7901c" xsi:nil="true"/>
-    <ScenarioTagsTaxHTField0 xmlns="7851d254-ce09-43b6-8d90-072588e7901c">
-      <Terms xmlns="http://schemas.microsoft.com/office/infopath/2007/PartnerControls"/>
-    </ScenarioTagsTaxHTField0>
-    <LocLastLocAttemptVersionTypeLookup xmlns="7851d254-ce09-43b6-8d90-072588e7901c" xsi:nil="true"/>
-    <LocOverallPublishStatusLookup xmlns="7851d254-ce09-43b6-8d90-072588e7901c" xsi:nil="true"/>
-    <LocPublishedLinkedAssetsLookup xmlns="7851d254-ce09-43b6-8d90-072588e7901c" xsi:nil="true"/>
-    <TaxCatchAll xmlns="7851d254-ce09-43b6-8d90-072588e7901c"/>
-    <LocRecommendedHandoff xmlns="7851d254-ce09-43b6-8d90-072588e7901c" xsi:nil="true"/>
-    <LocProcessedForHandoffsLookup xmlns="7851d254-ce09-43b6-8d90-072588e7901c" xsi:nil="true"/>
-    <LocOverallHandbackStatusLookup xmlns="7851d254-ce09-43b6-8d90-072588e7901c" xsi:nil="true"/>
-    <LocNewPublishedVersionLookup xmlns="7851d254-ce09-43b6-8d90-072588e7901c" xsi:nil="true"/>
-    <BlockPublish xmlns="7851d254-ce09-43b6-8d90-072588e7901c" xsi:nil="true"/>
-    <LocManualTestRequired xmlns="7851d254-ce09-43b6-8d90-072588e7901c" xsi:nil="true"/>
-    <LocalizationTagsTaxHTField0 xmlns="7851d254-ce09-43b6-8d90-072588e7901c">
-      <Terms xmlns="http://schemas.microsoft.com/office/infopath/2007/PartnerControls"/>
-    </LocalizationTagsTaxHTField0>
-    <LocLastLocAttemptVersionLookup xmlns="7851d254-ce09-43b6-8d90-072588e7901c">65845</LocLastLocAttemptVersionLookup>
-    <FeatureTagsTaxHTField0 xmlns="7851d254-ce09-43b6-8d90-072588e7901c">
-      <Terms xmlns="http://schemas.microsoft.com/office/infopath/2007/PartnerControls"/>
-    </FeatureTagsTaxHTField0>
-    <LocOverallPreviewStatusLookup xmlns="7851d254-ce09-43b6-8d90-072588e7901c" xsi:nil="true"/>
-    <RecommendationsModifier xmlns="7851d254-ce09-43b6-8d90-072588e7901c" xsi:nil="true"/>
-    <OriginalRelease xmlns="7851d254-ce09-43b6-8d90-072588e7901c">14</OriginalRelease>
-    <LocMarketGroupTiers2 xmlns="7851d254-ce09-43b6-8d90-072588e7901c" xsi:nil="true"/>
-  </documentManagement>
-</p:properties>
+<?mso-contentType ?>
+<FormTemplates xmlns="http://schemas.microsoft.com/sharepoint/v3/contenttype/forms">
+  <Display>DocumentLibraryForm</Display>
+  <Edit>AssetEditForm</Edit>
+  <New>DocumentLibraryForm</New>
+</FormTemplates>
 </file>
 
 <file path=customXml/item2.xml><?xml version="1.0" encoding="utf-8"?>
@@ -30801,20 +33756,146 @@
 </file>
 
 <file path=customXml/item3.xml><?xml version="1.0" encoding="utf-8"?>
-<?mso-contentType ?>
-<FormTemplates xmlns="http://schemas.microsoft.com/sharepoint/v3/contenttype/forms">
-  <Display>DocumentLibraryForm</Display>
-  <Edit>AssetEditForm</Edit>
-  <New>DocumentLibraryForm</New>
-</FormTemplates>
+<p:properties xmlns:p="http://schemas.microsoft.com/office/2006/metadata/properties" xmlns:xsi="http://www.w3.org/2001/XMLSchema-instance" xmlns:pc="http://schemas.microsoft.com/office/infopath/2007/PartnerControls">
+  <documentManagement>
+    <DirectSourceMarket xmlns="7851d254-ce09-43b6-8d90-072588e7901c">english</DirectSourceMarket>
+    <ApprovalStatus xmlns="7851d254-ce09-43b6-8d90-072588e7901c">InProgress</ApprovalStatus>
+    <MarketSpecific xmlns="7851d254-ce09-43b6-8d90-072588e7901c">false</MarketSpecific>
+    <PrimaryImageGen xmlns="7851d254-ce09-43b6-8d90-072588e7901c">true</PrimaryImageGen>
+    <ThumbnailAssetId xmlns="7851d254-ce09-43b6-8d90-072588e7901c" xsi:nil="true"/>
+    <LegacyData xmlns="7851d254-ce09-43b6-8d90-072588e7901c">ListingID:;Manager:;BuildStatus:Preview Pending;MockupPath:</LegacyData>
+    <TPFriendlyName xmlns="7851d254-ce09-43b6-8d90-072588e7901c">Marketing plan</TPFriendlyName>
+    <NumericId xmlns="7851d254-ce09-43b6-8d90-072588e7901c">-1</NumericId>
+    <BusinessGroup xmlns="7851d254-ce09-43b6-8d90-072588e7901c" xsi:nil="true"/>
+    <SourceTitle xmlns="7851d254-ce09-43b6-8d90-072588e7901c">Marketing plan</SourceTitle>
+    <APEditor xmlns="7851d254-ce09-43b6-8d90-072588e7901c">
+      <UserInfo>
+        <DisplayName>REDMOND\v-luannv</DisplayName>
+        <AccountId>237</AccountId>
+        <AccountType/>
+      </UserInfo>
+    </APEditor>
+    <OpenTemplate xmlns="7851d254-ce09-43b6-8d90-072588e7901c">true</OpenTemplate>
+    <UALocComments xmlns="7851d254-ce09-43b6-8d90-072588e7901c" xsi:nil="true"/>
+    <ParentAssetId xmlns="7851d254-ce09-43b6-8d90-072588e7901c" xsi:nil="true"/>
+    <PublishStatusLookup xmlns="7851d254-ce09-43b6-8d90-072588e7901c">
+      <Value>256759</Value>
+      <Value>353365</Value>
+    </PublishStatusLookup>
+    <LastPublishResultLookup xmlns="7851d254-ce09-43b6-8d90-072588e7901c" xsi:nil="true"/>
+    <IntlLangReviewDate xmlns="7851d254-ce09-43b6-8d90-072588e7901c">2010-04-16T13:14:00+00:00</IntlLangReviewDate>
+    <MachineTranslated xmlns="7851d254-ce09-43b6-8d90-072588e7901c">false</MachineTranslated>
+    <Providers xmlns="7851d254-ce09-43b6-8d90-072588e7901c" xsi:nil="true"/>
+    <OriginalSourceMarket xmlns="7851d254-ce09-43b6-8d90-072588e7901c">english</OriginalSourceMarket>
+    <TPInstallLocation xmlns="7851d254-ce09-43b6-8d90-072588e7901c">{My Templates}</TPInstallLocation>
+    <ClipArtFilename xmlns="7851d254-ce09-43b6-8d90-072588e7901c" xsi:nil="true"/>
+    <APDescription xmlns="7851d254-ce09-43b6-8d90-072588e7901c" xsi:nil="true"/>
+    <ContentItem xmlns="7851d254-ce09-43b6-8d90-072588e7901c" xsi:nil="true"/>
+    <APAuthor xmlns="7851d254-ce09-43b6-8d90-072588e7901c">
+      <UserInfo>
+        <DisplayName>REDMOND\cynvey</DisplayName>
+        <AccountId>242</AccountId>
+        <AccountType/>
+      </UserInfo>
+    </APAuthor>
+    <TPCommandLine xmlns="7851d254-ce09-43b6-8d90-072588e7901c">{PP} /n {FilePath}</TPCommandLine>
+    <TPAppVersion xmlns="7851d254-ce09-43b6-8d90-072588e7901c">11</TPAppVersion>
+    <PublishTargets xmlns="7851d254-ce09-43b6-8d90-072588e7901c">OfficeOnline</PublishTargets>
+    <EditorialStatus xmlns="7851d254-ce09-43b6-8d90-072588e7901c" xsi:nil="true"/>
+    <TPLaunchHelpLinkType xmlns="7851d254-ce09-43b6-8d90-072588e7901c" xsi:nil="true"/>
+    <LastModifiedDateTime xmlns="7851d254-ce09-43b6-8d90-072588e7901c">2010-04-16T13:14:00+00:00</LastModifiedDateTime>
+    <TimesCloned xmlns="7851d254-ce09-43b6-8d90-072588e7901c" xsi:nil="true"/>
+    <Provider xmlns="7851d254-ce09-43b6-8d90-072588e7901c">EY010390810</Provider>
+    <FriendlyTitle xmlns="7851d254-ce09-43b6-8d90-072588e7901c" xsi:nil="true"/>
+    <LastHandOff xmlns="7851d254-ce09-43b6-8d90-072588e7901c" xsi:nil="true"/>
+    <AcquiredFrom xmlns="7851d254-ce09-43b6-8d90-072588e7901c">Community</AcquiredFrom>
+    <AssetStart xmlns="7851d254-ce09-43b6-8d90-072588e7901c">2010-02-26T13:23:18+00:00</AssetStart>
+    <UACurrentWords xmlns="7851d254-ce09-43b6-8d90-072588e7901c">0</UACurrentWords>
+    <UALocRecommendation xmlns="7851d254-ce09-43b6-8d90-072588e7901c">Localize</UALocRecommendation>
+    <Manager xmlns="7851d254-ce09-43b6-8d90-072588e7901c" xsi:nil="true"/>
+    <TPClientViewer xmlns="7851d254-ce09-43b6-8d90-072588e7901c" xsi:nil="true"/>
+    <ArtSampleDocs xmlns="7851d254-ce09-43b6-8d90-072588e7901c" xsi:nil="true"/>
+    <IsDeleted xmlns="7851d254-ce09-43b6-8d90-072588e7901c">false</IsDeleted>
+    <UANotes xmlns="7851d254-ce09-43b6-8d90-072588e7901c">online only</UANotes>
+    <ShowIn xmlns="7851d254-ce09-43b6-8d90-072588e7901c">Show everywhere</ShowIn>
+    <OOCacheId xmlns="7851d254-ce09-43b6-8d90-072588e7901c" xsi:nil="true"/>
+    <CSXHash xmlns="7851d254-ce09-43b6-8d90-072588e7901c" xsi:nil="true"/>
+    <TemplateStatus xmlns="7851d254-ce09-43b6-8d90-072588e7901c" xsi:nil="true"/>
+    <Downloads xmlns="7851d254-ce09-43b6-8d90-072588e7901c">0</Downloads>
+    <VoteCount xmlns="7851d254-ce09-43b6-8d90-072588e7901c" xsi:nil="true"/>
+    <DSATActionTaken xmlns="7851d254-ce09-43b6-8d90-072588e7901c">Best Bets</DSATActionTaken>
+    <CSXSubmissionMarket xmlns="7851d254-ce09-43b6-8d90-072588e7901c" xsi:nil="true"/>
+    <AssetExpire xmlns="7851d254-ce09-43b6-8d90-072588e7901c">2100-01-01T00:00:00+00:00</AssetExpire>
+    <EditorialTags xmlns="7851d254-ce09-43b6-8d90-072588e7901c" xsi:nil="true"/>
+    <SubmitterId xmlns="7851d254-ce09-43b6-8d90-072588e7901c" xsi:nil="true"/>
+    <TPExecutable xmlns="7851d254-ce09-43b6-8d90-072588e7901c" xsi:nil="true"/>
+    <AssetType xmlns="7851d254-ce09-43b6-8d90-072588e7901c">TP</AssetType>
+    <ApprovalLog xmlns="7851d254-ce09-43b6-8d90-072588e7901c" xsi:nil="true"/>
+    <CSXUpdate xmlns="7851d254-ce09-43b6-8d90-072588e7901c">false</CSXUpdate>
+    <CSXSubmissionDate xmlns="7851d254-ce09-43b6-8d90-072588e7901c" xsi:nil="true"/>
+    <BugNumber xmlns="7851d254-ce09-43b6-8d90-072588e7901c" xsi:nil="true"/>
+    <TPComponent xmlns="7851d254-ce09-43b6-8d90-072588e7901c">PPTFiles</TPComponent>
+    <Milestone xmlns="7851d254-ce09-43b6-8d90-072588e7901c" xsi:nil="true"/>
+    <OriginAsset xmlns="7851d254-ce09-43b6-8d90-072588e7901c" xsi:nil="true"/>
+    <AssetId xmlns="7851d254-ce09-43b6-8d90-072588e7901c">TP010107969</AssetId>
+    <TPLaunchHelpLink xmlns="7851d254-ce09-43b6-8d90-072588e7901c" xsi:nil="true"/>
+    <TPApplication xmlns="7851d254-ce09-43b6-8d90-072588e7901c">PowerPoint</TPApplication>
+    <IntlLocPriority xmlns="7851d254-ce09-43b6-8d90-072588e7901c" xsi:nil="true"/>
+    <PolicheckWords xmlns="7851d254-ce09-43b6-8d90-072588e7901c" xsi:nil="true"/>
+    <HandoffToMSDN xmlns="7851d254-ce09-43b6-8d90-072588e7901c">2010-04-16T13:14:00+00:00</HandoffToMSDN>
+    <PlannedPubDate xmlns="7851d254-ce09-43b6-8d90-072588e7901c">2010-04-16T13:14:00+00:00</PlannedPubDate>
+    <IntlLangReviewer xmlns="7851d254-ce09-43b6-8d90-072588e7901c" xsi:nil="true"/>
+    <CrawlForDependencies xmlns="7851d254-ce09-43b6-8d90-072588e7901c">false</CrawlForDependencies>
+    <TrustLevel xmlns="7851d254-ce09-43b6-8d90-072588e7901c">1 Microsoft Managed Content</TrustLevel>
+    <IsSearchable xmlns="7851d254-ce09-43b6-8d90-072588e7901c">false</IsSearchable>
+    <TPNamespace xmlns="7851d254-ce09-43b6-8d90-072588e7901c" xsi:nil="true"/>
+    <TemplateTemplateType xmlns="7851d254-ce09-43b6-8d90-072588e7901c">PowerPoint 12 Default</TemplateTemplateType>
+    <Markets xmlns="7851d254-ce09-43b6-8d90-072588e7901c"/>
+    <OutputCachingOn xmlns="7851d254-ce09-43b6-8d90-072588e7901c">false</OutputCachingOn>
+    <IntlLangReview xmlns="7851d254-ce09-43b6-8d90-072588e7901c" xsi:nil="true"/>
+    <UAProjectedTotalWords xmlns="7851d254-ce09-43b6-8d90-072588e7901c" xsi:nil="true"/>
+    <CampaignTagsTaxHTField0 xmlns="7851d254-ce09-43b6-8d90-072588e7901c">
+      <Terms xmlns="http://schemas.microsoft.com/office/infopath/2007/PartnerControls"/>
+    </CampaignTagsTaxHTField0>
+    <LocPublishedDependentAssetsLookup xmlns="7851d254-ce09-43b6-8d90-072588e7901c" xsi:nil="true"/>
+    <LocOverallLocStatusLookup xmlns="7851d254-ce09-43b6-8d90-072588e7901c" xsi:nil="true"/>
+    <InternalTagsTaxHTField0 xmlns="7851d254-ce09-43b6-8d90-072588e7901c">
+      <Terms xmlns="http://schemas.microsoft.com/office/infopath/2007/PartnerControls"/>
+    </InternalTagsTaxHTField0>
+    <LocComments xmlns="7851d254-ce09-43b6-8d90-072588e7901c" xsi:nil="true"/>
+    <LocProcessedForMarketsLookup xmlns="7851d254-ce09-43b6-8d90-072588e7901c" xsi:nil="true"/>
+    <ScenarioTagsTaxHTField0 xmlns="7851d254-ce09-43b6-8d90-072588e7901c">
+      <Terms xmlns="http://schemas.microsoft.com/office/infopath/2007/PartnerControls"/>
+    </ScenarioTagsTaxHTField0>
+    <LocLastLocAttemptVersionTypeLookup xmlns="7851d254-ce09-43b6-8d90-072588e7901c" xsi:nil="true"/>
+    <LocOverallPublishStatusLookup xmlns="7851d254-ce09-43b6-8d90-072588e7901c" xsi:nil="true"/>
+    <LocPublishedLinkedAssetsLookup xmlns="7851d254-ce09-43b6-8d90-072588e7901c" xsi:nil="true"/>
+    <TaxCatchAll xmlns="7851d254-ce09-43b6-8d90-072588e7901c"/>
+    <LocRecommendedHandoff xmlns="7851d254-ce09-43b6-8d90-072588e7901c" xsi:nil="true"/>
+    <LocProcessedForHandoffsLookup xmlns="7851d254-ce09-43b6-8d90-072588e7901c" xsi:nil="true"/>
+    <LocOverallHandbackStatusLookup xmlns="7851d254-ce09-43b6-8d90-072588e7901c" xsi:nil="true"/>
+    <LocNewPublishedVersionLookup xmlns="7851d254-ce09-43b6-8d90-072588e7901c" xsi:nil="true"/>
+    <BlockPublish xmlns="7851d254-ce09-43b6-8d90-072588e7901c" xsi:nil="true"/>
+    <LocManualTestRequired xmlns="7851d254-ce09-43b6-8d90-072588e7901c" xsi:nil="true"/>
+    <LocalizationTagsTaxHTField0 xmlns="7851d254-ce09-43b6-8d90-072588e7901c">
+      <Terms xmlns="http://schemas.microsoft.com/office/infopath/2007/PartnerControls"/>
+    </LocalizationTagsTaxHTField0>
+    <LocLastLocAttemptVersionLookup xmlns="7851d254-ce09-43b6-8d90-072588e7901c">65845</LocLastLocAttemptVersionLookup>
+    <FeatureTagsTaxHTField0 xmlns="7851d254-ce09-43b6-8d90-072588e7901c">
+      <Terms xmlns="http://schemas.microsoft.com/office/infopath/2007/PartnerControls"/>
+    </FeatureTagsTaxHTField0>
+    <LocOverallPreviewStatusLookup xmlns="7851d254-ce09-43b6-8d90-072588e7901c" xsi:nil="true"/>
+    <RecommendationsModifier xmlns="7851d254-ce09-43b6-8d90-072588e7901c" xsi:nil="true"/>
+    <OriginalRelease xmlns="7851d254-ce09-43b6-8d90-072588e7901c">14</OriginalRelease>
+    <LocMarketGroupTiers2 xmlns="7851d254-ce09-43b6-8d90-072588e7901c" xsi:nil="true"/>
+  </documentManagement>
+</p:properties>
 </file>
 
 <file path=customXml/itemProps1.xml><?xml version="1.0" encoding="utf-8"?>
-<ds:datastoreItem xmlns:ds="http://schemas.openxmlformats.org/officeDocument/2006/customXml" ds:itemID="{79174311-CFD3-4DEA-AAFE-E3AA53D5174E}">
+<ds:datastoreItem xmlns:ds="http://schemas.openxmlformats.org/officeDocument/2006/customXml" ds:itemID="{C79E6502-E858-46F1-997F-A119CCAAD56C}">
   <ds:schemaRefs>
-    <ds:schemaRef ds:uri="http://schemas.microsoft.com/office/2006/metadata/properties"/>
-    <ds:schemaRef ds:uri="http://schemas.microsoft.com/office/infopath/2007/PartnerControls"/>
-    <ds:schemaRef ds:uri="7851d254-ce09-43b6-8d90-072588e7901c"/>
+    <ds:schemaRef ds:uri="http://schemas.microsoft.com/sharepoint/v3/contenttype/forms"/>
   </ds:schemaRefs>
 </ds:datastoreItem>
 </file>
@@ -30838,9 +33919,11 @@
 </file>
 
 <file path=customXml/itemProps3.xml><?xml version="1.0" encoding="utf-8"?>
-<ds:datastoreItem xmlns:ds="http://schemas.openxmlformats.org/officeDocument/2006/customXml" ds:itemID="{C79E6502-E858-46F1-997F-A119CCAAD56C}">
+<ds:datastoreItem xmlns:ds="http://schemas.openxmlformats.org/officeDocument/2006/customXml" ds:itemID="{79174311-CFD3-4DEA-AAFE-E3AA53D5174E}">
   <ds:schemaRefs>
-    <ds:schemaRef ds:uri="http://schemas.microsoft.com/sharepoint/v3/contenttype/forms"/>
+    <ds:schemaRef ds:uri="http://schemas.microsoft.com/office/2006/metadata/properties"/>
+    <ds:schemaRef ds:uri="http://schemas.microsoft.com/office/infopath/2007/PartnerControls"/>
+    <ds:schemaRef ds:uri="7851d254-ce09-43b6-8d90-072588e7901c"/>
   </ds:schemaRefs>
 </ds:datastoreItem>
 </file>
</xml_diff>